<commit_message>
New slides and .py files
Added new slides and reformatted the rest. Also included .py files for
presentation
</commit_message>
<xml_diff>
--- a/RabbitMQ.pptx
+++ b/RabbitMQ.pptx
@@ -5,7 +5,7 @@
     <p:sldMasterId id="2147483732" r:id="rId1"/>
   </p:sldMasterIdLst>
   <p:notesMasterIdLst>
-    <p:notesMasterId r:id="rId10"/>
+    <p:notesMasterId r:id="rId24"/>
   </p:notesMasterIdLst>
   <p:sldIdLst>
     <p:sldId id="256" r:id="rId2"/>
@@ -16,6 +16,20 @@
     <p:sldId id="261" r:id="rId7"/>
     <p:sldId id="260" r:id="rId8"/>
     <p:sldId id="263" r:id="rId9"/>
+    <p:sldId id="266" r:id="rId10"/>
+    <p:sldId id="264" r:id="rId11"/>
+    <p:sldId id="265" r:id="rId12"/>
+    <p:sldId id="267" r:id="rId13"/>
+    <p:sldId id="268" r:id="rId14"/>
+    <p:sldId id="278" r:id="rId15"/>
+    <p:sldId id="273" r:id="rId16"/>
+    <p:sldId id="279" r:id="rId17"/>
+    <p:sldId id="270" r:id="rId18"/>
+    <p:sldId id="272" r:id="rId19"/>
+    <p:sldId id="274" r:id="rId20"/>
+    <p:sldId id="275" r:id="rId21"/>
+    <p:sldId id="276" r:id="rId22"/>
+    <p:sldId id="277" r:id="rId23"/>
   </p:sldIdLst>
   <p:sldSz cx="9144000" cy="6858000" type="screen4x3"/>
   <p:notesSz cx="6858000" cy="9144000"/>
@@ -199,7 +213,8 @@
           <a:p>
             <a:fld id="{95A3CA4E-0E7A-4135-ACD8-08987F38E324}" type="datetimeFigureOut">
               <a:rPr lang="pl-PL" smtClean="0"/>
-              <a:t>2014-01-25</a:t>
+              <a:pPr/>
+              <a:t>2014-01-26</a:t>
             </a:fld>
             <a:endParaRPr lang="pl-PL"/>
           </a:p>
@@ -358,6 +373,7 @@
           <a:p>
             <a:fld id="{78D0BBAC-3E95-4F0D-AD68-5E0E104D504E}" type="slidenum">
               <a:rPr lang="pl-PL" smtClean="0"/>
+              <a:pPr/>
               <a:t>‹#›</a:t>
             </a:fld>
             <a:endParaRPr lang="pl-PL"/>
@@ -367,7 +383,7 @@
     </p:spTree>
     <p:extLst>
       <p:ext uri="{BB962C8B-B14F-4D97-AF65-F5344CB8AC3E}">
-        <p14:creationId xmlns:p14="http://schemas.microsoft.com/office/powerpoint/2010/main" val="46650772"/>
+        <p14:creationId xmlns:p14="http://schemas.microsoft.com/office/powerpoint/2010/main" xmlns="" val="46650772"/>
       </p:ext>
     </p:extLst>
   </p:cSld>
@@ -580,6 +596,7 @@
           <a:p>
             <a:fld id="{78D0BBAC-3E95-4F0D-AD68-5E0E104D504E}" type="slidenum">
               <a:rPr lang="pl-PL" smtClean="0"/>
+              <a:pPr/>
               <a:t>2</a:t>
             </a:fld>
             <a:endParaRPr lang="pl-PL"/>
@@ -589,7 +606,7 @@
     </p:spTree>
     <p:extLst>
       <p:ext uri="{BB962C8B-B14F-4D97-AF65-F5344CB8AC3E}">
-        <p14:creationId xmlns:p14="http://schemas.microsoft.com/office/powerpoint/2010/main" val="815577397"/>
+        <p14:creationId xmlns:p14="http://schemas.microsoft.com/office/powerpoint/2010/main" xmlns="" val="815577397"/>
       </p:ext>
     </p:extLst>
   </p:cSld>
@@ -701,6 +718,7 @@
           <a:p>
             <a:fld id="{78D0BBAC-3E95-4F0D-AD68-5E0E104D504E}" type="slidenum">
               <a:rPr lang="pl-PL" smtClean="0"/>
+              <a:pPr/>
               <a:t>3</a:t>
             </a:fld>
             <a:endParaRPr lang="pl-PL"/>
@@ -710,7 +728,7 @@
     </p:spTree>
     <p:extLst>
       <p:ext uri="{BB962C8B-B14F-4D97-AF65-F5344CB8AC3E}">
-        <p14:creationId xmlns:p14="http://schemas.microsoft.com/office/powerpoint/2010/main" val="368020526"/>
+        <p14:creationId xmlns:p14="http://schemas.microsoft.com/office/powerpoint/2010/main" xmlns="" val="368020526"/>
       </p:ext>
     </p:extLst>
   </p:cSld>
@@ -863,6 +881,7 @@
           <a:p>
             <a:fld id="{78D0BBAC-3E95-4F0D-AD68-5E0E104D504E}" type="slidenum">
               <a:rPr lang="pl-PL" smtClean="0"/>
+              <a:pPr/>
               <a:t>4</a:t>
             </a:fld>
             <a:endParaRPr lang="pl-PL"/>
@@ -872,7 +891,7 @@
     </p:spTree>
     <p:extLst>
       <p:ext uri="{BB962C8B-B14F-4D97-AF65-F5344CB8AC3E}">
-        <p14:creationId xmlns:p14="http://schemas.microsoft.com/office/powerpoint/2010/main" val="4116805919"/>
+        <p14:creationId xmlns:p14="http://schemas.microsoft.com/office/powerpoint/2010/main" xmlns="" val="4116805919"/>
       </p:ext>
     </p:extLst>
   </p:cSld>
@@ -982,6 +1001,7 @@
           <a:p>
             <a:fld id="{78D0BBAC-3E95-4F0D-AD68-5E0E104D504E}" type="slidenum">
               <a:rPr lang="pl-PL" smtClean="0"/>
+              <a:pPr/>
               <a:t>5</a:t>
             </a:fld>
             <a:endParaRPr lang="pl-PL"/>
@@ -991,7 +1011,7 @@
     </p:spTree>
     <p:extLst>
       <p:ext uri="{BB962C8B-B14F-4D97-AF65-F5344CB8AC3E}">
-        <p14:creationId xmlns:p14="http://schemas.microsoft.com/office/powerpoint/2010/main" val="4104382869"/>
+        <p14:creationId xmlns:p14="http://schemas.microsoft.com/office/powerpoint/2010/main" xmlns="" val="4104382869"/>
       </p:ext>
     </p:extLst>
   </p:cSld>
@@ -1046,6 +1066,130 @@
           <a:lstStyle/>
           <a:p>
             <a:r>
+              <a:rPr lang="pl-PL" sz="1200" b="0" i="0" kern="1200" dirty="0" smtClean="0">
+                <a:solidFill>
+                  <a:schemeClr val="tx1"/>
+                </a:solidFill>
+                <a:effectLst/>
+                <a:latin typeface="+mn-lt"/>
+                <a:ea typeface="+mn-ea"/>
+                <a:cs typeface="+mn-cs"/>
+              </a:rPr>
+              <a:t>Asynchroniczne porozumiewanie</a:t>
+            </a:r>
+            <a:r>
+              <a:rPr lang="pl-PL" sz="1200" b="0" i="0" kern="1200" baseline="0" dirty="0" smtClean="0">
+                <a:solidFill>
+                  <a:schemeClr val="tx1"/>
+                </a:solidFill>
+                <a:effectLst/>
+                <a:latin typeface="+mn-lt"/>
+                <a:ea typeface="+mn-ea"/>
+                <a:cs typeface="+mn-cs"/>
+              </a:rPr>
+              <a:t> – oddzielenie wysyłania od odbierania</a:t>
+            </a:r>
+          </a:p>
+          <a:p>
+            <a:endParaRPr lang="pl-PL" sz="1200" b="0" i="0" kern="1200" baseline="0" dirty="0" smtClean="0">
+              <a:solidFill>
+                <a:schemeClr val="tx1"/>
+              </a:solidFill>
+              <a:effectLst/>
+              <a:latin typeface="+mn-lt"/>
+              <a:ea typeface="+mn-ea"/>
+              <a:cs typeface="+mn-cs"/>
+            </a:endParaRPr>
+          </a:p>
+          <a:p>
+            <a:r>
+              <a:rPr lang="pl-PL" sz="1200" b="0" i="0" kern="1200" baseline="0" dirty="0" smtClean="0">
+                <a:solidFill>
+                  <a:schemeClr val="tx1"/>
+                </a:solidFill>
+                <a:effectLst/>
+                <a:latin typeface="+mn-lt"/>
+                <a:ea typeface="+mn-ea"/>
+                <a:cs typeface="+mn-cs"/>
+              </a:rPr>
+              <a:t>Kompatybilność – współpracuje z większością systemów operacyjnych i języków</a:t>
+            </a:r>
+          </a:p>
+          <a:p>
+            <a:endParaRPr lang="pl-PL" sz="1200" b="0" i="0" kern="1200" baseline="0" dirty="0" smtClean="0">
+              <a:solidFill>
+                <a:schemeClr val="tx1"/>
+              </a:solidFill>
+              <a:effectLst/>
+              <a:latin typeface="+mn-lt"/>
+              <a:ea typeface="+mn-ea"/>
+              <a:cs typeface="+mn-cs"/>
+            </a:endParaRPr>
+          </a:p>
+          <a:p>
+            <a:r>
+              <a:rPr lang="pl-PL" sz="1200" b="0" i="0" kern="1200" baseline="0" dirty="0" err="1" smtClean="0">
+                <a:solidFill>
+                  <a:schemeClr val="tx1"/>
+                </a:solidFill>
+                <a:effectLst/>
+                <a:latin typeface="+mn-lt"/>
+                <a:ea typeface="+mn-ea"/>
+                <a:cs typeface="+mn-cs"/>
+              </a:rPr>
+              <a:t>Multi-protocl</a:t>
+            </a:r>
+            <a:r>
+              <a:rPr lang="pl-PL" sz="1200" b="0" i="0" kern="1200" baseline="0" dirty="0" smtClean="0">
+                <a:solidFill>
+                  <a:schemeClr val="tx1"/>
+                </a:solidFill>
+                <a:effectLst/>
+                <a:latin typeface="+mn-lt"/>
+                <a:ea typeface="+mn-ea"/>
+                <a:cs typeface="+mn-cs"/>
+              </a:rPr>
+              <a:t> – implementuje wiele protokołów</a:t>
+            </a:r>
+          </a:p>
+          <a:p>
+            <a:r>
+              <a:rPr lang="pl-PL" sz="1200" b="0" i="0" kern="1200" dirty="0" smtClean="0">
+                <a:solidFill>
+                  <a:schemeClr val="tx1"/>
+                </a:solidFill>
+                <a:effectLst/>
+                <a:latin typeface="+mn-lt"/>
+                <a:ea typeface="+mn-ea"/>
+                <a:cs typeface="+mn-cs"/>
+              </a:rPr>
+              <a:t/>
+            </a:r>
+            <a:br>
+              <a:rPr lang="pl-PL" sz="1200" b="0" i="0" kern="1200" dirty="0" smtClean="0">
+                <a:solidFill>
+                  <a:schemeClr val="tx1"/>
+                </a:solidFill>
+                <a:effectLst/>
+                <a:latin typeface="+mn-lt"/>
+                <a:ea typeface="+mn-ea"/>
+                <a:cs typeface="+mn-cs"/>
+              </a:rPr>
+            </a:br>
+            <a:endParaRPr lang="pl-PL" sz="1200" b="1" i="0" u="none" strike="noStrike" kern="1200" dirty="0" smtClean="0">
+              <a:solidFill>
+                <a:schemeClr val="tx1"/>
+              </a:solidFill>
+              <a:effectLst/>
+              <a:latin typeface="+mn-lt"/>
+              <a:ea typeface="+mn-ea"/>
+              <a:cs typeface="+mn-cs"/>
+              <a:hlinkClick r:id="rId3"/>
+            </a:endParaRPr>
+          </a:p>
+          <a:p>
+            <a:pPr lvl="1"/>
+            <a:r>
               <a:rPr lang="en-US" sz="1200" b="1" i="0" u="none" strike="noStrike" kern="1200" dirty="0" smtClean="0">
                 <a:solidFill>
                   <a:schemeClr val="tx1"/>
@@ -1251,6 +1395,7 @@
             </a:r>
           </a:p>
           <a:p>
+            <a:pPr lvl="1"/>
             <a:r>
               <a:rPr lang="en-US" sz="1200" b="0" i="0" kern="1200" dirty="0" smtClean="0">
                 <a:solidFill>
@@ -1274,7 +1419,20 @@
                 <a:cs typeface="+mn-cs"/>
                 <a:hlinkClick r:id="rId5"/>
               </a:rPr>
-              <a:t>management plugin</a:t>
+              <a:t>management </a:t>
+            </a:r>
+            <a:r>
+              <a:rPr lang="en-US" sz="1200" b="1" i="0" u="none" strike="noStrike" kern="1200" dirty="0" err="1" smtClean="0">
+                <a:solidFill>
+                  <a:schemeClr val="tx1"/>
+                </a:solidFill>
+                <a:effectLst/>
+                <a:latin typeface="+mn-lt"/>
+                <a:ea typeface="+mn-ea"/>
+                <a:cs typeface="+mn-cs"/>
+                <a:hlinkClick r:id="rId5"/>
+              </a:rPr>
+              <a:t>plugin</a:t>
             </a:r>
             <a:r>
               <a:rPr lang="en-US" sz="1200" b="0" i="0" kern="1200" dirty="0" smtClean="0">
@@ -1315,6 +1473,7 @@
             </a:r>
           </a:p>
           <a:p>
+            <a:pPr lvl="1"/>
             <a:r>
               <a:rPr lang="en-US" sz="1200" b="0" i="0" kern="1200" dirty="0" smtClean="0">
                 <a:solidFill>
@@ -1338,7 +1497,20 @@
                 <a:cs typeface="+mn-cs"/>
                 <a:hlinkClick r:id="rId7"/>
               </a:rPr>
-              <a:t>Web-STOMP plugin</a:t>
+              <a:t>Web-STOMP </a:t>
+            </a:r>
+            <a:r>
+              <a:rPr lang="en-US" sz="1200" b="1" i="0" u="none" strike="noStrike" kern="1200" dirty="0" err="1" smtClean="0">
+                <a:solidFill>
+                  <a:schemeClr val="tx1"/>
+                </a:solidFill>
+                <a:effectLst/>
+                <a:latin typeface="+mn-lt"/>
+                <a:ea typeface="+mn-ea"/>
+                <a:cs typeface="+mn-cs"/>
+                <a:hlinkClick r:id="rId7"/>
+              </a:rPr>
+              <a:t>plugin</a:t>
             </a:r>
             <a:r>
               <a:rPr lang="en-US" sz="1200" b="0" i="0" kern="1200" dirty="0" smtClean="0">
@@ -1402,6 +1574,7 @@
             </a:r>
           </a:p>
           <a:p>
+            <a:pPr lvl="1"/>
             <a:r>
               <a:rPr lang="en-US" sz="1200" b="0" i="0" kern="1200" dirty="0" smtClean="0">
                 <a:solidFill>
@@ -1425,7 +1598,20 @@
                 <a:cs typeface="+mn-cs"/>
                 <a:hlinkClick r:id="rId8"/>
               </a:rPr>
-              <a:t>JSON-RPC channel plugin</a:t>
+              <a:t>JSON-RPC channel </a:t>
+            </a:r>
+            <a:r>
+              <a:rPr lang="en-US" sz="1200" b="1" i="0" u="none" strike="noStrike" kern="1200" dirty="0" err="1" smtClean="0">
+                <a:solidFill>
+                  <a:schemeClr val="tx1"/>
+                </a:solidFill>
+                <a:effectLst/>
+                <a:latin typeface="+mn-lt"/>
+                <a:ea typeface="+mn-ea"/>
+                <a:cs typeface="+mn-cs"/>
+                <a:hlinkClick r:id="rId8"/>
+              </a:rPr>
+              <a:t>plugin</a:t>
             </a:r>
             <a:r>
               <a:rPr lang="en-US" sz="1200" b="0" i="0" kern="1200" dirty="0" smtClean="0">
@@ -1488,6 +1674,257 @@
               </a:rPr>
               <a:t> delivery to the client are emulated by polling.</a:t>
             </a:r>
+            <a:endParaRPr lang="pl-PL" sz="1200" b="0" i="0" kern="1200" dirty="0" smtClean="0">
+              <a:solidFill>
+                <a:schemeClr val="tx1"/>
+              </a:solidFill>
+              <a:effectLst/>
+              <a:latin typeface="+mn-lt"/>
+              <a:ea typeface="+mn-ea"/>
+              <a:cs typeface="+mn-cs"/>
+            </a:endParaRPr>
+          </a:p>
+          <a:p>
+            <a:endParaRPr lang="pl-PL" sz="1200" b="0" i="0" kern="1200" dirty="0" smtClean="0">
+              <a:solidFill>
+                <a:schemeClr val="tx1"/>
+              </a:solidFill>
+              <a:effectLst/>
+              <a:latin typeface="+mn-lt"/>
+              <a:ea typeface="+mn-ea"/>
+              <a:cs typeface="+mn-cs"/>
+            </a:endParaRPr>
+          </a:p>
+          <a:p>
+            <a:r>
+              <a:rPr lang="pl-PL" sz="1200" b="0" i="0" kern="1200" dirty="0" err="1" smtClean="0">
+                <a:solidFill>
+                  <a:schemeClr val="tx1"/>
+                </a:solidFill>
+                <a:effectLst/>
+                <a:latin typeface="+mn-lt"/>
+                <a:ea typeface="+mn-ea"/>
+                <a:cs typeface="+mn-cs"/>
+              </a:rPr>
+              <a:t>Rabbit.mq</a:t>
+            </a:r>
+            <a:r>
+              <a:rPr lang="pl-PL" sz="1200" b="0" i="0" kern="1200" dirty="0" smtClean="0">
+                <a:solidFill>
+                  <a:schemeClr val="tx1"/>
+                </a:solidFill>
+                <a:effectLst/>
+                <a:latin typeface="+mn-lt"/>
+                <a:ea typeface="+mn-ea"/>
+                <a:cs typeface="+mn-cs"/>
+              </a:rPr>
+              <a:t> </a:t>
+            </a:r>
+            <a:r>
+              <a:rPr lang="pl-PL" sz="1200" b="0" i="0" kern="1200" baseline="0" dirty="0" smtClean="0">
+                <a:solidFill>
+                  <a:schemeClr val="tx1"/>
+                </a:solidFill>
+                <a:effectLst/>
+                <a:latin typeface="+mn-lt"/>
+                <a:ea typeface="+mn-ea"/>
+                <a:cs typeface="+mn-cs"/>
+              </a:rPr>
+              <a:t> - bardzo dobrze wsparcie ze strony twórców, jasne </a:t>
+            </a:r>
+            <a:r>
+              <a:rPr lang="pl-PL" sz="1200" b="0" i="0" kern="1200" baseline="0" dirty="0" err="1" smtClean="0">
+                <a:solidFill>
+                  <a:schemeClr val="tx1"/>
+                </a:solidFill>
+                <a:effectLst/>
+                <a:latin typeface="+mn-lt"/>
+                <a:ea typeface="+mn-ea"/>
+                <a:cs typeface="+mn-cs"/>
+              </a:rPr>
+              <a:t>tutoriale</a:t>
+            </a:r>
+            <a:endParaRPr lang="pl-PL" sz="1200" b="0" i="0" kern="1200" baseline="0" dirty="0" smtClean="0">
+              <a:solidFill>
+                <a:schemeClr val="tx1"/>
+              </a:solidFill>
+              <a:effectLst/>
+              <a:latin typeface="+mn-lt"/>
+              <a:ea typeface="+mn-ea"/>
+              <a:cs typeface="+mn-cs"/>
+            </a:endParaRPr>
+          </a:p>
+          <a:p>
+            <a:r>
+              <a:rPr lang="pl-PL" sz="1200" b="0" i="0" kern="1200" baseline="0" dirty="0" smtClean="0">
+                <a:solidFill>
+                  <a:schemeClr val="tx1"/>
+                </a:solidFill>
+                <a:effectLst/>
+                <a:latin typeface="+mn-lt"/>
+                <a:ea typeface="+mn-ea"/>
+                <a:cs typeface="+mn-cs"/>
+              </a:rPr>
+              <a:t>Niezawodny  - </a:t>
+            </a:r>
+            <a:r>
+              <a:rPr lang="pl-PL" sz="1200" b="0" i="0" kern="1200" baseline="0" dirty="0" err="1" smtClean="0">
+                <a:solidFill>
+                  <a:schemeClr val="tx1"/>
+                </a:solidFill>
+                <a:effectLst/>
+                <a:latin typeface="+mn-lt"/>
+                <a:ea typeface="+mn-ea"/>
+                <a:cs typeface="+mn-cs"/>
+              </a:rPr>
+              <a:t>message</a:t>
+            </a:r>
+            <a:r>
+              <a:rPr lang="pl-PL" sz="1200" b="0" i="0" kern="1200" baseline="0" dirty="0" smtClean="0">
+                <a:solidFill>
+                  <a:schemeClr val="tx1"/>
+                </a:solidFill>
+                <a:effectLst/>
+                <a:latin typeface="+mn-lt"/>
+                <a:ea typeface="+mn-ea"/>
+                <a:cs typeface="+mn-cs"/>
+              </a:rPr>
+              <a:t> </a:t>
+            </a:r>
+            <a:r>
+              <a:rPr lang="pl-PL" sz="1200" b="0" i="0" kern="1200" baseline="0" dirty="0" err="1" smtClean="0">
+                <a:solidFill>
+                  <a:schemeClr val="tx1"/>
+                </a:solidFill>
+                <a:effectLst/>
+                <a:latin typeface="+mn-lt"/>
+                <a:ea typeface="+mn-ea"/>
+                <a:cs typeface="+mn-cs"/>
+              </a:rPr>
+              <a:t>acknowledgment</a:t>
+            </a:r>
+            <a:r>
+              <a:rPr lang="pl-PL" sz="1200" b="0" i="0" kern="1200" baseline="0" dirty="0" smtClean="0">
+                <a:solidFill>
+                  <a:schemeClr val="tx1"/>
+                </a:solidFill>
+                <a:effectLst/>
+                <a:latin typeface="+mn-lt"/>
+                <a:ea typeface="+mn-ea"/>
+                <a:cs typeface="+mn-cs"/>
+              </a:rPr>
+              <a:t> (potwierdzenie dostarczenia), </a:t>
+            </a:r>
+          </a:p>
+          <a:p>
+            <a:r>
+              <a:rPr lang="pl-PL" sz="1200" b="0" i="0" kern="1200" baseline="0" dirty="0" smtClean="0">
+                <a:solidFill>
+                  <a:schemeClr val="tx1"/>
+                </a:solidFill>
+                <a:effectLst/>
+                <a:latin typeface="+mn-lt"/>
+                <a:ea typeface="+mn-ea"/>
+                <a:cs typeface="+mn-cs"/>
+              </a:rPr>
+              <a:t>	-</a:t>
+            </a:r>
+            <a:r>
+              <a:rPr lang="pl-PL" sz="1200" b="0" i="0" kern="1200" baseline="0" dirty="0" err="1" smtClean="0">
+                <a:solidFill>
+                  <a:schemeClr val="tx1"/>
+                </a:solidFill>
+                <a:effectLst/>
+                <a:latin typeface="+mn-lt"/>
+                <a:ea typeface="+mn-ea"/>
+                <a:cs typeface="+mn-cs"/>
+              </a:rPr>
+              <a:t>message</a:t>
+            </a:r>
+            <a:r>
+              <a:rPr lang="pl-PL" sz="1200" b="0" i="0" kern="1200" baseline="0" dirty="0" smtClean="0">
+                <a:solidFill>
+                  <a:schemeClr val="tx1"/>
+                </a:solidFill>
+                <a:effectLst/>
+                <a:latin typeface="+mn-lt"/>
+                <a:ea typeface="+mn-ea"/>
+                <a:cs typeface="+mn-cs"/>
+              </a:rPr>
+              <a:t> and </a:t>
+            </a:r>
+            <a:r>
+              <a:rPr lang="pl-PL" sz="1200" b="0" i="0" kern="1200" baseline="0" dirty="0" err="1" smtClean="0">
+                <a:solidFill>
+                  <a:schemeClr val="tx1"/>
+                </a:solidFill>
+                <a:effectLst/>
+                <a:latin typeface="+mn-lt"/>
+                <a:ea typeface="+mn-ea"/>
+                <a:cs typeface="+mn-cs"/>
+              </a:rPr>
+              <a:t>queue</a:t>
+            </a:r>
+            <a:r>
+              <a:rPr lang="pl-PL" sz="1200" b="0" i="0" kern="1200" baseline="0" dirty="0" smtClean="0">
+                <a:solidFill>
+                  <a:schemeClr val="tx1"/>
+                </a:solidFill>
+                <a:effectLst/>
+                <a:latin typeface="+mn-lt"/>
+                <a:ea typeface="+mn-ea"/>
+                <a:cs typeface="+mn-cs"/>
+              </a:rPr>
+              <a:t> </a:t>
+            </a:r>
+            <a:r>
+              <a:rPr lang="pl-PL" sz="1200" b="0" i="0" kern="1200" baseline="0" dirty="0" err="1" smtClean="0">
+                <a:solidFill>
+                  <a:schemeClr val="tx1"/>
+                </a:solidFill>
+                <a:effectLst/>
+                <a:latin typeface="+mn-lt"/>
+                <a:ea typeface="+mn-ea"/>
+                <a:cs typeface="+mn-cs"/>
+              </a:rPr>
+              <a:t>durability</a:t>
+            </a:r>
+            <a:r>
+              <a:rPr lang="pl-PL" sz="1200" b="0" i="0" kern="1200" baseline="0" dirty="0" smtClean="0">
+                <a:solidFill>
+                  <a:schemeClr val="tx1"/>
+                </a:solidFill>
+                <a:effectLst/>
+                <a:latin typeface="+mn-lt"/>
+                <a:ea typeface="+mn-ea"/>
+                <a:cs typeface="+mn-cs"/>
+              </a:rPr>
+              <a:t> (wiadomości zostaną zapisane na dysku i jak </a:t>
+            </a:r>
+            <a:r>
+              <a:rPr lang="pl-PL" sz="1200" b="0" i="0" kern="1200" baseline="0" dirty="0" err="1" smtClean="0">
+                <a:solidFill>
+                  <a:schemeClr val="tx1"/>
+                </a:solidFill>
+                <a:effectLst/>
+                <a:latin typeface="+mn-lt"/>
+                <a:ea typeface="+mn-ea"/>
+                <a:cs typeface="+mn-cs"/>
+              </a:rPr>
+              <a:t>rabbit</a:t>
+            </a:r>
+            <a:r>
+              <a:rPr lang="pl-PL" sz="1200" b="0" i="0" kern="1200" baseline="0" dirty="0" smtClean="0">
+                <a:solidFill>
+                  <a:schemeClr val="tx1"/>
+                </a:solidFill>
+                <a:effectLst/>
+                <a:latin typeface="+mn-lt"/>
+                <a:ea typeface="+mn-ea"/>
+                <a:cs typeface="+mn-cs"/>
+              </a:rPr>
+              <a:t> padnie nic nie zginie) </a:t>
+            </a:r>
             <a:r>
               <a:rPr lang="pl-PL" sz="1200" b="0" i="0" kern="1200" dirty="0" smtClean="0">
                 <a:solidFill>
@@ -1521,54 +1958,8 @@
                 <a:ea typeface="+mn-ea"/>
                 <a:cs typeface="+mn-cs"/>
               </a:rPr>
-              <a:t/>
-            </a:r>
-            <a:br>
-              <a:rPr lang="pl-PL" sz="1200" b="0" i="0" kern="1200" dirty="0" smtClean="0">
-                <a:solidFill>
-                  <a:schemeClr val="tx1"/>
-                </a:solidFill>
-                <a:effectLst/>
-                <a:latin typeface="+mn-lt"/>
-                <a:ea typeface="+mn-ea"/>
-                <a:cs typeface="+mn-cs"/>
-              </a:rPr>
-            </a:br>
-            <a:r>
-              <a:rPr lang="pl-PL" sz="1200" b="0" i="0" kern="1200" dirty="0" smtClean="0">
-                <a:solidFill>
-                  <a:schemeClr val="tx1"/>
-                </a:solidFill>
-                <a:effectLst/>
-                <a:latin typeface="+mn-lt"/>
-                <a:ea typeface="+mn-ea"/>
-                <a:cs typeface="+mn-cs"/>
-              </a:rPr>
-              <a:t>Bezpieczeństwo dzięki dublowaniu</a:t>
-            </a:r>
-            <a:r>
-              <a:rPr lang="pl-PL" sz="1200" b="0" i="0" kern="1200" baseline="0" dirty="0" smtClean="0">
-                <a:solidFill>
-                  <a:schemeClr val="tx1"/>
-                </a:solidFill>
-                <a:effectLst/>
-                <a:latin typeface="+mn-lt"/>
-                <a:ea typeface="+mn-ea"/>
-                <a:cs typeface="+mn-cs"/>
-              </a:rPr>
-              <a:t> kolejek na kilku maszynach w klastrze.</a:t>
-            </a:r>
-            <a:br>
-              <a:rPr lang="pl-PL" sz="1200" b="0" i="0" kern="1200" baseline="0" dirty="0" smtClean="0">
-                <a:solidFill>
-                  <a:schemeClr val="tx1"/>
-                </a:solidFill>
-                <a:effectLst/>
-                <a:latin typeface="+mn-lt"/>
-                <a:ea typeface="+mn-ea"/>
-                <a:cs typeface="+mn-cs"/>
-              </a:rPr>
-            </a:br>
+              <a:t>	-</a:t>
+            </a:r>
             <a:r>
               <a:rPr lang="pl-PL" sz="1200" b="0" i="0" kern="1200" baseline="0" dirty="0" err="1" smtClean="0">
                 <a:solidFill>
@@ -1591,7 +1982,7 @@
                 <a:ea typeface="+mn-ea"/>
                 <a:cs typeface="+mn-cs"/>
               </a:rPr>
-              <a:t> – sieć wzajemnych powiązań</a:t>
+              <a:t>: sieć wzajemnych powiązań</a:t>
             </a:r>
             <a:endParaRPr lang="en-US" sz="1200" b="0" i="0" kern="1200" dirty="0" smtClean="0">
               <a:solidFill>
@@ -1625,6 +2016,7 @@
           <a:p>
             <a:fld id="{78D0BBAC-3E95-4F0D-AD68-5E0E104D504E}" type="slidenum">
               <a:rPr lang="pl-PL" smtClean="0"/>
+              <a:pPr/>
               <a:t>7</a:t>
             </a:fld>
             <a:endParaRPr lang="pl-PL"/>
@@ -1634,9 +2026,248 @@
     </p:spTree>
     <p:extLst>
       <p:ext uri="{BB962C8B-B14F-4D97-AF65-F5344CB8AC3E}">
-        <p14:creationId xmlns:p14="http://schemas.microsoft.com/office/powerpoint/2010/main" val="2423778747"/>
+        <p14:creationId xmlns:p14="http://schemas.microsoft.com/office/powerpoint/2010/main" xmlns="" val="2423778747"/>
       </p:ext>
     </p:extLst>
+  </p:cSld>
+  <p:clrMapOvr>
+    <a:masterClrMapping/>
+  </p:clrMapOvr>
+</p:notes>
+</file>
+
+<file path=ppt/notesSlides/notesSlide6.xml><?xml version="1.0" encoding="utf-8"?>
+<p:notes xmlns:a="http://schemas.openxmlformats.org/drawingml/2006/main" xmlns:r="http://schemas.openxmlformats.org/officeDocument/2006/relationships" xmlns:p="http://schemas.openxmlformats.org/presentationml/2006/main">
+  <p:cSld>
+    <p:spTree>
+      <p:nvGrpSpPr>
+        <p:cNvPr id="1" name=""/>
+        <p:cNvGrpSpPr/>
+        <p:nvPr/>
+      </p:nvGrpSpPr>
+      <p:grpSpPr>
+        <a:xfrm>
+          <a:off x="0" y="0"/>
+          <a:ext cx="0" cy="0"/>
+          <a:chOff x="0" y="0"/>
+          <a:chExt cx="0" cy="0"/>
+        </a:xfrm>
+      </p:grpSpPr>
+      <p:sp>
+        <p:nvSpPr>
+          <p:cNvPr id="2" name="Symbol zastępczy obrazu slajdu 1"/>
+          <p:cNvSpPr>
+            <a:spLocks noGrp="1" noRot="1" noChangeAspect="1"/>
+          </p:cNvSpPr>
+          <p:nvPr>
+            <p:ph type="sldImg"/>
+          </p:nvPr>
+        </p:nvSpPr>
+        <p:spPr/>
+      </p:sp>
+      <p:sp>
+        <p:nvSpPr>
+          <p:cNvPr id="3" name="Symbol zastępczy notatek 2"/>
+          <p:cNvSpPr>
+            <a:spLocks noGrp="1"/>
+          </p:cNvSpPr>
+          <p:nvPr>
+            <p:ph type="body" idx="1"/>
+          </p:nvPr>
+        </p:nvSpPr>
+        <p:spPr/>
+        <p:txBody>
+          <a:bodyPr>
+            <a:normAutofit/>
+          </a:bodyPr>
+          <a:lstStyle/>
+          <a:p>
+            <a:r>
+              <a:rPr lang="pl-PL" dirty="0" err="1" smtClean="0"/>
+              <a:t>Publish</a:t>
+            </a:r>
+            <a:r>
+              <a:rPr lang="pl-PL" dirty="0" smtClean="0"/>
+              <a:t>/</a:t>
+            </a:r>
+            <a:r>
+              <a:rPr lang="pl-PL" dirty="0" err="1" smtClean="0"/>
+              <a:t>subscribe</a:t>
+            </a:r>
+            <a:r>
+              <a:rPr lang="pl-PL" dirty="0" smtClean="0"/>
+              <a:t> – </a:t>
+            </a:r>
+            <a:r>
+              <a:rPr lang="pl-PL" dirty="0" err="1" smtClean="0"/>
+              <a:t>pattern</a:t>
+            </a:r>
+            <a:r>
+              <a:rPr lang="pl-PL" dirty="0" smtClean="0"/>
+              <a:t>,</a:t>
+            </a:r>
+            <a:r>
+              <a:rPr lang="pl-PL" baseline="0" dirty="0" smtClean="0"/>
+              <a:t> w którym wysyłający wiadomości nie określa ich drogi, a tylko do kogo ma dotrzeć. </a:t>
+            </a:r>
+            <a:r>
+              <a:rPr lang="pl-PL" baseline="0" dirty="0" err="1" smtClean="0"/>
+              <a:t>Routingiem</a:t>
+            </a:r>
+            <a:r>
+              <a:rPr lang="pl-PL" baseline="0" dirty="0" smtClean="0"/>
+              <a:t> zajmuje się środek aplikacji. Tak samo odbierającego nie interesuje nawet istnienie kolejki – określa on tylko typ wiadomości, na którą oczekuje. Dobrze pasuje do naszego </a:t>
+            </a:r>
+            <a:r>
+              <a:rPr lang="pl-PL" baseline="0" dirty="0" err="1" smtClean="0"/>
+              <a:t>probelmu</a:t>
+            </a:r>
+            <a:r>
+              <a:rPr lang="pl-PL" baseline="0" dirty="0" smtClean="0"/>
+              <a:t> z jednym </a:t>
+            </a:r>
+            <a:r>
+              <a:rPr lang="pl-PL" baseline="0" dirty="0" err="1" smtClean="0"/>
+              <a:t>publisherem</a:t>
+            </a:r>
+            <a:r>
+              <a:rPr lang="pl-PL" baseline="0" dirty="0" smtClean="0"/>
+              <a:t> i wieloma </a:t>
+            </a:r>
+            <a:r>
+              <a:rPr lang="pl-PL" baseline="0" dirty="0" err="1" smtClean="0"/>
+              <a:t>subscriberami</a:t>
+            </a:r>
+            <a:r>
+              <a:rPr lang="pl-PL" baseline="0" dirty="0" smtClean="0"/>
+              <a:t>.</a:t>
+            </a:r>
+            <a:endParaRPr lang="pl-PL" dirty="0"/>
+          </a:p>
+        </p:txBody>
+      </p:sp>
+      <p:sp>
+        <p:nvSpPr>
+          <p:cNvPr id="4" name="Symbol zastępczy numeru slajdu 3"/>
+          <p:cNvSpPr>
+            <a:spLocks noGrp="1"/>
+          </p:cNvSpPr>
+          <p:nvPr>
+            <p:ph type="sldNum" sz="quarter" idx="10"/>
+          </p:nvPr>
+        </p:nvSpPr>
+        <p:spPr/>
+        <p:txBody>
+          <a:bodyPr/>
+          <a:lstStyle/>
+          <a:p>
+            <a:fld id="{78D0BBAC-3E95-4F0D-AD68-5E0E104D504E}" type="slidenum">
+              <a:rPr lang="pl-PL" smtClean="0"/>
+              <a:pPr/>
+              <a:t>18</a:t>
+            </a:fld>
+            <a:endParaRPr lang="pl-PL"/>
+          </a:p>
+        </p:txBody>
+      </p:sp>
+    </p:spTree>
+  </p:cSld>
+  <p:clrMapOvr>
+    <a:masterClrMapping/>
+  </p:clrMapOvr>
+</p:notes>
+</file>
+
+<file path=ppt/notesSlides/notesSlide7.xml><?xml version="1.0" encoding="utf-8"?>
+<p:notes xmlns:a="http://schemas.openxmlformats.org/drawingml/2006/main" xmlns:r="http://schemas.openxmlformats.org/officeDocument/2006/relationships" xmlns:p="http://schemas.openxmlformats.org/presentationml/2006/main">
+  <p:cSld>
+    <p:spTree>
+      <p:nvGrpSpPr>
+        <p:cNvPr id="1" name=""/>
+        <p:cNvGrpSpPr/>
+        <p:nvPr/>
+      </p:nvGrpSpPr>
+      <p:grpSpPr>
+        <a:xfrm>
+          <a:off x="0" y="0"/>
+          <a:ext cx="0" cy="0"/>
+          <a:chOff x="0" y="0"/>
+          <a:chExt cx="0" cy="0"/>
+        </a:xfrm>
+      </p:grpSpPr>
+      <p:sp>
+        <p:nvSpPr>
+          <p:cNvPr id="2" name="Symbol zastępczy obrazu slajdu 1"/>
+          <p:cNvSpPr>
+            <a:spLocks noGrp="1" noRot="1" noChangeAspect="1"/>
+          </p:cNvSpPr>
+          <p:nvPr>
+            <p:ph type="sldImg"/>
+          </p:nvPr>
+        </p:nvSpPr>
+        <p:spPr/>
+      </p:sp>
+      <p:sp>
+        <p:nvSpPr>
+          <p:cNvPr id="3" name="Symbol zastępczy notatek 2"/>
+          <p:cNvSpPr>
+            <a:spLocks noGrp="1"/>
+          </p:cNvSpPr>
+          <p:nvPr>
+            <p:ph type="body" idx="1"/>
+          </p:nvPr>
+        </p:nvSpPr>
+        <p:spPr/>
+        <p:txBody>
+          <a:bodyPr>
+            <a:normAutofit/>
+          </a:bodyPr>
+          <a:lstStyle/>
+          <a:p>
+            <a:r>
+              <a:rPr lang="pl-PL" dirty="0" smtClean="0"/>
+              <a:t>Exchange jak i </a:t>
+            </a:r>
+            <a:r>
+              <a:rPr lang="pl-PL" dirty="0" err="1" smtClean="0"/>
+              <a:t>binding</a:t>
+            </a:r>
+            <a:r>
+              <a:rPr lang="pl-PL" dirty="0" smtClean="0"/>
+              <a:t> mogą</a:t>
+            </a:r>
+            <a:r>
+              <a:rPr lang="pl-PL" baseline="0" dirty="0" smtClean="0"/>
+              <a:t> być różnych typów – dzięki temu możemy sterować przepływem różnych wiadomości do różnych odbiorców. </a:t>
+            </a:r>
+          </a:p>
+        </p:txBody>
+      </p:sp>
+      <p:sp>
+        <p:nvSpPr>
+          <p:cNvPr id="4" name="Symbol zastępczy numeru slajdu 3"/>
+          <p:cNvSpPr>
+            <a:spLocks noGrp="1"/>
+          </p:cNvSpPr>
+          <p:nvPr>
+            <p:ph type="sldNum" sz="quarter" idx="10"/>
+          </p:nvPr>
+        </p:nvSpPr>
+        <p:spPr/>
+        <p:txBody>
+          <a:bodyPr/>
+          <a:lstStyle/>
+          <a:p>
+            <a:fld id="{78D0BBAC-3E95-4F0D-AD68-5E0E104D504E}" type="slidenum">
+              <a:rPr lang="pl-PL" smtClean="0"/>
+              <a:pPr/>
+              <a:t>19</a:t>
+            </a:fld>
+            <a:endParaRPr lang="pl-PL"/>
+          </a:p>
+        </p:txBody>
+      </p:sp>
+    </p:spTree>
   </p:cSld>
   <p:clrMapOvr>
     <a:masterClrMapping/>
@@ -1836,7 +2467,8 @@
           <a:p>
             <a:fld id="{33BC9DE7-0B50-4C46-82C3-642717E248C8}" type="datetimeFigureOut">
               <a:rPr lang="pl-PL" smtClean="0"/>
-              <a:t>2014-01-25</a:t>
+              <a:pPr/>
+              <a:t>2014-01-26</a:t>
             </a:fld>
             <a:endParaRPr lang="pl-PL"/>
           </a:p>
@@ -1859,6 +2491,7 @@
           <a:p>
             <a:fld id="{CAA52BEE-25E8-4873-8823-B7265AD368D1}" type="slidenum">
               <a:rPr lang="pl-PL" smtClean="0"/>
+              <a:pPr/>
               <a:t>‹#›</a:t>
             </a:fld>
             <a:endParaRPr lang="pl-PL"/>
@@ -2001,7 +2634,8 @@
           <a:p>
             <a:fld id="{33BC9DE7-0B50-4C46-82C3-642717E248C8}" type="datetimeFigureOut">
               <a:rPr lang="pl-PL" smtClean="0"/>
-              <a:t>2014-01-25</a:t>
+              <a:pPr/>
+              <a:t>2014-01-26</a:t>
             </a:fld>
             <a:endParaRPr lang="pl-PL"/>
           </a:p>
@@ -2043,6 +2677,7 @@
           <a:p>
             <a:fld id="{CAA52BEE-25E8-4873-8823-B7265AD368D1}" type="slidenum">
               <a:rPr lang="pl-PL" smtClean="0"/>
+              <a:pPr/>
               <a:t>‹#›</a:t>
             </a:fld>
             <a:endParaRPr lang="pl-PL"/>
@@ -2176,7 +2811,8 @@
           <a:p>
             <a:fld id="{33BC9DE7-0B50-4C46-82C3-642717E248C8}" type="datetimeFigureOut">
               <a:rPr lang="pl-PL" smtClean="0"/>
-              <a:t>2014-01-25</a:t>
+              <a:pPr/>
+              <a:t>2014-01-26</a:t>
             </a:fld>
             <a:endParaRPr lang="pl-PL"/>
           </a:p>
@@ -2218,6 +2854,7 @@
           <a:p>
             <a:fld id="{CAA52BEE-25E8-4873-8823-B7265AD368D1}" type="slidenum">
               <a:rPr lang="pl-PL" smtClean="0"/>
+              <a:pPr/>
               <a:t>‹#›</a:t>
             </a:fld>
             <a:endParaRPr lang="pl-PL"/>
@@ -2359,7 +2996,8 @@
           <a:p>
             <a:fld id="{33BC9DE7-0B50-4C46-82C3-642717E248C8}" type="datetimeFigureOut">
               <a:rPr lang="pl-PL" smtClean="0"/>
-              <a:t>2014-01-25</a:t>
+              <a:pPr/>
+              <a:t>2014-01-26</a:t>
             </a:fld>
             <a:endParaRPr lang="pl-PL"/>
           </a:p>
@@ -2401,6 +3039,7 @@
           <a:p>
             <a:fld id="{CAA52BEE-25E8-4873-8823-B7265AD368D1}" type="slidenum">
               <a:rPr lang="pl-PL" smtClean="0"/>
+              <a:pPr/>
               <a:t>‹#›</a:t>
             </a:fld>
             <a:endParaRPr lang="pl-PL"/>
@@ -2621,7 +3260,8 @@
           <a:p>
             <a:fld id="{33BC9DE7-0B50-4C46-82C3-642717E248C8}" type="datetimeFigureOut">
               <a:rPr lang="pl-PL" smtClean="0"/>
-              <a:t>2014-01-25</a:t>
+              <a:pPr/>
+              <a:t>2014-01-26</a:t>
             </a:fld>
             <a:endParaRPr lang="pl-PL"/>
           </a:p>
@@ -2663,6 +3303,7 @@
           <a:p>
             <a:fld id="{CAA52BEE-25E8-4873-8823-B7265AD368D1}" type="slidenum">
               <a:rPr lang="pl-PL" smtClean="0"/>
+              <a:pPr/>
               <a:t>‹#›</a:t>
             </a:fld>
             <a:endParaRPr lang="pl-PL"/>
@@ -2969,7 +3610,8 @@
           <a:p>
             <a:fld id="{33BC9DE7-0B50-4C46-82C3-642717E248C8}" type="datetimeFigureOut">
               <a:rPr lang="pl-PL" smtClean="0"/>
-              <a:t>2014-01-25</a:t>
+              <a:pPr/>
+              <a:t>2014-01-26</a:t>
             </a:fld>
             <a:endParaRPr lang="pl-PL"/>
           </a:p>
@@ -3011,6 +3653,7 @@
           <a:p>
             <a:fld id="{CAA52BEE-25E8-4873-8823-B7265AD368D1}" type="slidenum">
               <a:rPr lang="pl-PL" smtClean="0"/>
+              <a:pPr/>
               <a:t>‹#›</a:t>
             </a:fld>
             <a:endParaRPr lang="pl-PL"/>
@@ -3277,7 +3920,8 @@
           <a:p>
             <a:fld id="{33BC9DE7-0B50-4C46-82C3-642717E248C8}" type="datetimeFigureOut">
               <a:rPr lang="pl-PL" smtClean="0"/>
-              <a:t>2014-01-25</a:t>
+              <a:pPr/>
+              <a:t>2014-01-26</a:t>
             </a:fld>
             <a:endParaRPr lang="pl-PL"/>
           </a:p>
@@ -3319,6 +3963,7 @@
           <a:p>
             <a:fld id="{CAA52BEE-25E8-4873-8823-B7265AD368D1}" type="slidenum">
               <a:rPr lang="pl-PL" smtClean="0"/>
+              <a:pPr/>
               <a:t>‹#›</a:t>
             </a:fld>
             <a:endParaRPr lang="pl-PL"/>
@@ -3504,7 +4149,8 @@
           <a:p>
             <a:fld id="{33BC9DE7-0B50-4C46-82C3-642717E248C8}" type="datetimeFigureOut">
               <a:rPr lang="pl-PL" smtClean="0"/>
-              <a:t>2014-01-25</a:t>
+              <a:pPr/>
+              <a:t>2014-01-26</a:t>
             </a:fld>
             <a:endParaRPr lang="pl-PL"/>
           </a:p>
@@ -3546,6 +4192,7 @@
           <a:p>
             <a:fld id="{CAA52BEE-25E8-4873-8823-B7265AD368D1}" type="slidenum">
               <a:rPr lang="pl-PL" smtClean="0"/>
+              <a:pPr/>
               <a:t>‹#›</a:t>
             </a:fld>
             <a:endParaRPr lang="pl-PL"/>
@@ -3594,7 +4241,8 @@
           <a:p>
             <a:fld id="{33BC9DE7-0B50-4C46-82C3-642717E248C8}" type="datetimeFigureOut">
               <a:rPr lang="pl-PL" smtClean="0"/>
-              <a:t>2014-01-25</a:t>
+              <a:pPr/>
+              <a:t>2014-01-26</a:t>
             </a:fld>
             <a:endParaRPr lang="pl-PL"/>
           </a:p>
@@ -3636,6 +4284,7 @@
           <a:p>
             <a:fld id="{CAA52BEE-25E8-4873-8823-B7265AD368D1}" type="slidenum">
               <a:rPr lang="pl-PL" smtClean="0"/>
+              <a:pPr/>
               <a:t>‹#›</a:t>
             </a:fld>
             <a:endParaRPr lang="pl-PL"/>
@@ -3882,7 +4531,8 @@
           <a:p>
             <a:fld id="{33BC9DE7-0B50-4C46-82C3-642717E248C8}" type="datetimeFigureOut">
               <a:rPr lang="pl-PL" smtClean="0"/>
-              <a:t>2014-01-25</a:t>
+              <a:pPr/>
+              <a:t>2014-01-26</a:t>
             </a:fld>
             <a:endParaRPr lang="pl-PL"/>
           </a:p>
@@ -3924,6 +4574,7 @@
           <a:p>
             <a:fld id="{CAA52BEE-25E8-4873-8823-B7265AD368D1}" type="slidenum">
               <a:rPr lang="pl-PL" smtClean="0"/>
+              <a:pPr/>
               <a:t>‹#›</a:t>
             </a:fld>
             <a:endParaRPr lang="pl-PL"/>
@@ -4151,7 +4802,8 @@
           <a:p>
             <a:fld id="{33BC9DE7-0B50-4C46-82C3-642717E248C8}" type="datetimeFigureOut">
               <a:rPr lang="pl-PL" smtClean="0"/>
-              <a:t>2014-01-25</a:t>
+              <a:pPr/>
+              <a:t>2014-01-26</a:t>
             </a:fld>
             <a:endParaRPr lang="pl-PL"/>
           </a:p>
@@ -4193,6 +4845,7 @@
           <a:p>
             <a:fld id="{CAA52BEE-25E8-4873-8823-B7265AD368D1}" type="slidenum">
               <a:rPr lang="pl-PL" smtClean="0"/>
+              <a:pPr/>
               <a:t>‹#›</a:t>
             </a:fld>
             <a:endParaRPr lang="pl-PL"/>
@@ -4361,7 +5014,8 @@
           <a:p>
             <a:fld id="{33BC9DE7-0B50-4C46-82C3-642717E248C8}" type="datetimeFigureOut">
               <a:rPr lang="pl-PL" smtClean="0"/>
-              <a:t>2014-01-25</a:t>
+              <a:pPr/>
+              <a:t>2014-01-26</a:t>
             </a:fld>
             <a:endParaRPr lang="pl-PL"/>
           </a:p>
@@ -4443,6 +5097,7 @@
           <a:p>
             <a:fld id="{CAA52BEE-25E8-4873-8823-B7265AD368D1}" type="slidenum">
               <a:rPr lang="pl-PL" smtClean="0"/>
+              <a:pPr/>
               <a:t>‹#›</a:t>
             </a:fld>
             <a:endParaRPr lang="pl-PL"/>
@@ -4889,7 +5544,12 @@
             <p:ph type="ctrTitle"/>
           </p:nvPr>
         </p:nvSpPr>
-        <p:spPr/>
+        <p:spPr>
+          <a:xfrm>
+            <a:off x="904056" y="-171400"/>
+            <a:ext cx="7772400" cy="4267200"/>
+          </a:xfrm>
+        </p:spPr>
         <p:txBody>
           <a:bodyPr/>
           <a:lstStyle/>
@@ -4897,6 +5557,55 @@
             <a:r>
               <a:rPr lang="pl-PL" dirty="0" err="1" smtClean="0"/>
               <a:t>RabbitMQ</a:t>
+            </a:r>
+            <a:endParaRPr lang="pl-PL" dirty="0"/>
+          </a:p>
+        </p:txBody>
+      </p:sp>
+      <p:sp>
+        <p:nvSpPr>
+          <p:cNvPr id="3" name="pole tekstowe 2"/>
+          <p:cNvSpPr txBox="1"/>
+          <p:nvPr/>
+        </p:nvSpPr>
+        <p:spPr>
+          <a:xfrm>
+            <a:off x="5652120" y="5385990"/>
+            <a:ext cx="3028906" cy="923330"/>
+          </a:xfrm>
+          <a:prstGeom prst="rect">
+            <a:avLst/>
+          </a:prstGeom>
+          <a:noFill/>
+        </p:spPr>
+        <p:txBody>
+          <a:bodyPr wrap="none" rtlCol="0">
+            <a:spAutoFit/>
+          </a:bodyPr>
+          <a:lstStyle/>
+          <a:p>
+            <a:r>
+              <a:rPr lang="pl-PL" b="1" dirty="0" smtClean="0"/>
+              <a:t>Autorzy:</a:t>
+            </a:r>
+          </a:p>
+          <a:p>
+            <a:pPr lvl="1"/>
+            <a:r>
+              <a:rPr lang="pl-PL" dirty="0" smtClean="0"/>
+              <a:t>Kajetan </a:t>
+            </a:r>
+            <a:r>
+              <a:rPr lang="pl-PL" dirty="0" err="1" smtClean="0"/>
+              <a:t>Tunia-Jaworski</a:t>
+            </a:r>
+            <a:endParaRPr lang="pl-PL" dirty="0" smtClean="0"/>
+          </a:p>
+          <a:p>
+            <a:pPr lvl="1"/>
+            <a:r>
+              <a:rPr lang="pl-PL" dirty="0" smtClean="0"/>
+              <a:t>Jacek Żyła</a:t>
             </a:r>
             <a:endParaRPr lang="pl-PL" dirty="0"/>
           </a:p>
@@ -4905,13 +5614,1641 @@
     </p:spTree>
     <p:extLst>
       <p:ext uri="{BB962C8B-B14F-4D97-AF65-F5344CB8AC3E}">
-        <p14:creationId xmlns:p14="http://schemas.microsoft.com/office/powerpoint/2010/main" val="3094915382"/>
+        <p14:creationId xmlns:p14="http://schemas.microsoft.com/office/powerpoint/2010/main" xmlns="" val="3094915382"/>
       </p:ext>
     </p:extLst>
   </p:cSld>
   <p:clrMapOvr>
     <a:masterClrMapping/>
   </p:clrMapOvr>
+  <p:timing>
+    <p:tnLst>
+      <p:par>
+        <p:cTn id="1" dur="indefinite" restart="never" nodeType="tmRoot"/>
+      </p:par>
+    </p:tnLst>
+  </p:timing>
+</p:sld>
+</file>
+
+<file path=ppt/slides/slide10.xml><?xml version="1.0" encoding="utf-8"?>
+<p:sld xmlns:a="http://schemas.openxmlformats.org/drawingml/2006/main" xmlns:r="http://schemas.openxmlformats.org/officeDocument/2006/relationships" xmlns:p="http://schemas.openxmlformats.org/presentationml/2006/main">
+  <p:cSld>
+    <p:spTree>
+      <p:nvGrpSpPr>
+        <p:cNvPr id="1" name=""/>
+        <p:cNvGrpSpPr/>
+        <p:nvPr/>
+      </p:nvGrpSpPr>
+      <p:grpSpPr>
+        <a:xfrm>
+          <a:off x="0" y="0"/>
+          <a:ext cx="0" cy="0"/>
+          <a:chOff x="0" y="0"/>
+          <a:chExt cx="0" cy="0"/>
+        </a:xfrm>
+      </p:grpSpPr>
+      <p:sp>
+        <p:nvSpPr>
+          <p:cNvPr id="2" name="Tytuł 1"/>
+          <p:cNvSpPr>
+            <a:spLocks noGrp="1"/>
+          </p:cNvSpPr>
+          <p:nvPr>
+            <p:ph type="title"/>
+          </p:nvPr>
+        </p:nvSpPr>
+        <p:spPr/>
+        <p:txBody>
+          <a:bodyPr/>
+          <a:lstStyle/>
+          <a:p>
+            <a:r>
+              <a:rPr lang="pl-PL" dirty="0" smtClean="0"/>
+              <a:t>Elementy</a:t>
+            </a:r>
+            <a:endParaRPr lang="pl-PL" dirty="0"/>
+          </a:p>
+        </p:txBody>
+      </p:sp>
+      <p:pic>
+        <p:nvPicPr>
+          <p:cNvPr id="1026" name="Picture 2" descr="http://www.rabbitmq.com/img/tutorials/producer.png"/>
+          <p:cNvPicPr>
+            <a:picLocks noChangeAspect="1" noChangeArrowheads="1"/>
+          </p:cNvPicPr>
+          <p:nvPr/>
+        </p:nvPicPr>
+        <p:blipFill>
+          <a:blip r:embed="rId2" cstate="print"/>
+          <a:srcRect/>
+          <a:stretch>
+            <a:fillRect/>
+          </a:stretch>
+        </p:blipFill>
+        <p:spPr bwMode="auto">
+          <a:xfrm>
+            <a:off x="2555776" y="2439169"/>
+            <a:ext cx="676275" cy="485775"/>
+          </a:xfrm>
+          <a:prstGeom prst="rect">
+            <a:avLst/>
+          </a:prstGeom>
+          <a:noFill/>
+        </p:spPr>
+      </p:pic>
+      <p:pic>
+        <p:nvPicPr>
+          <p:cNvPr id="1028" name="Picture 4" descr="http://www.rabbitmq.com/img/tutorials/queue.png"/>
+          <p:cNvPicPr>
+            <a:picLocks noChangeAspect="1" noChangeArrowheads="1"/>
+          </p:cNvPicPr>
+          <p:nvPr/>
+        </p:nvPicPr>
+        <p:blipFill>
+          <a:blip r:embed="rId3" cstate="print"/>
+          <a:srcRect/>
+          <a:stretch>
+            <a:fillRect/>
+          </a:stretch>
+        </p:blipFill>
+        <p:spPr bwMode="auto">
+          <a:xfrm>
+            <a:off x="2267744" y="3231257"/>
+            <a:ext cx="1238250" cy="866776"/>
+          </a:xfrm>
+          <a:prstGeom prst="rect">
+            <a:avLst/>
+          </a:prstGeom>
+          <a:noFill/>
+        </p:spPr>
+      </p:pic>
+      <p:pic>
+        <p:nvPicPr>
+          <p:cNvPr id="1030" name="Picture 6" descr="http://www.rabbitmq.com/img/tutorials/consumer.png"/>
+          <p:cNvPicPr>
+            <a:picLocks noChangeAspect="1" noChangeArrowheads="1"/>
+          </p:cNvPicPr>
+          <p:nvPr/>
+        </p:nvPicPr>
+        <p:blipFill>
+          <a:blip r:embed="rId4" cstate="print"/>
+          <a:srcRect/>
+          <a:stretch>
+            <a:fillRect/>
+          </a:stretch>
+        </p:blipFill>
+        <p:spPr bwMode="auto">
+          <a:xfrm>
+            <a:off x="2555776" y="4743425"/>
+            <a:ext cx="676275" cy="485775"/>
+          </a:xfrm>
+          <a:prstGeom prst="rect">
+            <a:avLst/>
+          </a:prstGeom>
+          <a:noFill/>
+        </p:spPr>
+      </p:pic>
+      <p:sp>
+        <p:nvSpPr>
+          <p:cNvPr id="7" name="pole tekstowe 6"/>
+          <p:cNvSpPr txBox="1"/>
+          <p:nvPr/>
+        </p:nvSpPr>
+        <p:spPr>
+          <a:xfrm>
+            <a:off x="3557978" y="2501885"/>
+            <a:ext cx="3299301" cy="369332"/>
+          </a:xfrm>
+          <a:prstGeom prst="rect">
+            <a:avLst/>
+          </a:prstGeom>
+          <a:noFill/>
+        </p:spPr>
+        <p:txBody>
+          <a:bodyPr wrap="none" rtlCol="0">
+            <a:spAutoFit/>
+          </a:bodyPr>
+          <a:lstStyle/>
+          <a:p>
+            <a:pPr algn="ctr"/>
+            <a:r>
+              <a:rPr lang="pl-PL" dirty="0" err="1" smtClean="0"/>
+              <a:t>Producer</a:t>
+            </a:r>
+            <a:r>
+              <a:rPr lang="pl-PL" dirty="0" smtClean="0"/>
+              <a:t> (wysyła wiadomość)</a:t>
+            </a:r>
+            <a:endParaRPr lang="pl-PL" dirty="0"/>
+          </a:p>
+        </p:txBody>
+      </p:sp>
+      <p:sp>
+        <p:nvSpPr>
+          <p:cNvPr id="8" name="pole tekstowe 7"/>
+          <p:cNvSpPr txBox="1"/>
+          <p:nvPr/>
+        </p:nvSpPr>
+        <p:spPr>
+          <a:xfrm>
+            <a:off x="3600051" y="3591297"/>
+            <a:ext cx="3200107" cy="369332"/>
+          </a:xfrm>
+          <a:prstGeom prst="rect">
+            <a:avLst/>
+          </a:prstGeom>
+        </p:spPr>
+        <p:txBody>
+          <a:bodyPr wrap="none" rtlCol="0">
+            <a:spAutoFit/>
+          </a:bodyPr>
+          <a:lstStyle/>
+          <a:p>
+            <a:pPr algn="ctr"/>
+            <a:r>
+              <a:rPr lang="pl-PL" dirty="0" err="1" smtClean="0"/>
+              <a:t>Queue</a:t>
+            </a:r>
+            <a:r>
+              <a:rPr lang="pl-PL" dirty="0" smtClean="0"/>
+              <a:t> (kolejka priorytetowa)</a:t>
+            </a:r>
+            <a:endParaRPr lang="pl-PL" dirty="0"/>
+          </a:p>
+        </p:txBody>
+      </p:sp>
+      <p:sp>
+        <p:nvSpPr>
+          <p:cNvPr id="9" name="Symbol zastępczy zawartości 8"/>
+          <p:cNvSpPr txBox="1">
+            <a:spLocks noGrp="1"/>
+          </p:cNvSpPr>
+          <p:nvPr>
+            <p:ph idx="1"/>
+          </p:nvPr>
+        </p:nvSpPr>
+        <p:spPr>
+          <a:xfrm>
+            <a:off x="457200" y="1600200"/>
+            <a:ext cx="530915" cy="461665"/>
+          </a:xfrm>
+          <a:prstGeom prst="rect">
+            <a:avLst/>
+          </a:prstGeom>
+          <a:noFill/>
+        </p:spPr>
+        <p:txBody>
+          <a:bodyPr wrap="none" rtlCol="0">
+            <a:spAutoFit/>
+          </a:bodyPr>
+          <a:lstStyle/>
+          <a:p>
+            <a:endParaRPr lang="pl-PL" dirty="0"/>
+          </a:p>
+        </p:txBody>
+      </p:sp>
+      <p:sp>
+        <p:nvSpPr>
+          <p:cNvPr id="11" name="pole tekstowe 10"/>
+          <p:cNvSpPr txBox="1"/>
+          <p:nvPr/>
+        </p:nvSpPr>
+        <p:spPr>
+          <a:xfrm>
+            <a:off x="3504197" y="4815433"/>
+            <a:ext cx="3475631" cy="369332"/>
+          </a:xfrm>
+          <a:prstGeom prst="rect">
+            <a:avLst/>
+          </a:prstGeom>
+        </p:spPr>
+        <p:txBody>
+          <a:bodyPr wrap="none" rtlCol="0">
+            <a:spAutoFit/>
+          </a:bodyPr>
+          <a:lstStyle/>
+          <a:p>
+            <a:pPr algn="ctr"/>
+            <a:r>
+              <a:rPr lang="pl-PL" dirty="0" smtClean="0"/>
+              <a:t>Consumer (odbiera wiadomość)</a:t>
+            </a:r>
+            <a:endParaRPr lang="pl-PL" dirty="0"/>
+          </a:p>
+        </p:txBody>
+      </p:sp>
+    </p:spTree>
+  </p:cSld>
+  <p:clrMapOvr>
+    <a:masterClrMapping/>
+  </p:clrMapOvr>
+  <p:timing>
+    <p:tnLst>
+      <p:par>
+        <p:cTn id="1" dur="indefinite" restart="never" nodeType="tmRoot"/>
+      </p:par>
+    </p:tnLst>
+  </p:timing>
+</p:sld>
+</file>
+
+<file path=ppt/slides/slide11.xml><?xml version="1.0" encoding="utf-8"?>
+<p:sld xmlns:a="http://schemas.openxmlformats.org/drawingml/2006/main" xmlns:r="http://schemas.openxmlformats.org/officeDocument/2006/relationships" xmlns:p="http://schemas.openxmlformats.org/presentationml/2006/main">
+  <p:cSld>
+    <p:spTree>
+      <p:nvGrpSpPr>
+        <p:cNvPr id="1" name=""/>
+        <p:cNvGrpSpPr/>
+        <p:nvPr/>
+      </p:nvGrpSpPr>
+      <p:grpSpPr>
+        <a:xfrm>
+          <a:off x="0" y="0"/>
+          <a:ext cx="0" cy="0"/>
+          <a:chOff x="0" y="0"/>
+          <a:chExt cx="0" cy="0"/>
+        </a:xfrm>
+      </p:grpSpPr>
+      <p:sp>
+        <p:nvSpPr>
+          <p:cNvPr id="2" name="Tytuł 1"/>
+          <p:cNvSpPr>
+            <a:spLocks noGrp="1"/>
+          </p:cNvSpPr>
+          <p:nvPr>
+            <p:ph type="title"/>
+          </p:nvPr>
+        </p:nvSpPr>
+        <p:spPr/>
+        <p:txBody>
+          <a:bodyPr/>
+          <a:lstStyle/>
+          <a:p>
+            <a:r>
+              <a:rPr lang="pl-PL" dirty="0" err="1" smtClean="0"/>
+              <a:t>Hello</a:t>
+            </a:r>
+            <a:r>
+              <a:rPr lang="pl-PL" dirty="0" smtClean="0"/>
+              <a:t> </a:t>
+            </a:r>
+            <a:r>
+              <a:rPr lang="pl-PL" dirty="0" err="1" smtClean="0"/>
+              <a:t>World</a:t>
+            </a:r>
+            <a:r>
+              <a:rPr lang="pl-PL" dirty="0" smtClean="0"/>
+              <a:t>!</a:t>
+            </a:r>
+            <a:endParaRPr lang="pl-PL" dirty="0"/>
+          </a:p>
+        </p:txBody>
+      </p:sp>
+      <p:sp>
+        <p:nvSpPr>
+          <p:cNvPr id="3" name="Symbol zastępczy zawartości 2"/>
+          <p:cNvSpPr>
+            <a:spLocks noGrp="1"/>
+          </p:cNvSpPr>
+          <p:nvPr>
+            <p:ph idx="1"/>
+          </p:nvPr>
+        </p:nvSpPr>
+        <p:spPr/>
+        <p:txBody>
+          <a:bodyPr/>
+          <a:lstStyle/>
+          <a:p>
+            <a:endParaRPr lang="pl-PL"/>
+          </a:p>
+        </p:txBody>
+      </p:sp>
+      <p:pic>
+        <p:nvPicPr>
+          <p:cNvPr id="28674" name="Picture 2" descr="http://www.rabbitmq.com/img/tutorials/python-one-overall.png"/>
+          <p:cNvPicPr>
+            <a:picLocks noChangeAspect="1" noChangeArrowheads="1"/>
+          </p:cNvPicPr>
+          <p:nvPr/>
+        </p:nvPicPr>
+        <p:blipFill>
+          <a:blip r:embed="rId2" cstate="print"/>
+          <a:srcRect/>
+          <a:stretch>
+            <a:fillRect/>
+          </a:stretch>
+        </p:blipFill>
+        <p:spPr bwMode="auto">
+          <a:xfrm>
+            <a:off x="3131840" y="3268588"/>
+            <a:ext cx="2743200" cy="952500"/>
+          </a:xfrm>
+          <a:prstGeom prst="rect">
+            <a:avLst/>
+          </a:prstGeom>
+          <a:noFill/>
+        </p:spPr>
+      </p:pic>
+    </p:spTree>
+  </p:cSld>
+  <p:clrMapOvr>
+    <a:masterClrMapping/>
+  </p:clrMapOvr>
+  <p:timing>
+    <p:tnLst>
+      <p:par>
+        <p:cTn id="1" dur="indefinite" restart="never" nodeType="tmRoot"/>
+      </p:par>
+    </p:tnLst>
+  </p:timing>
+</p:sld>
+</file>
+
+<file path=ppt/slides/slide12.xml><?xml version="1.0" encoding="utf-8"?>
+<p:sld xmlns:a="http://schemas.openxmlformats.org/drawingml/2006/main" xmlns:r="http://schemas.openxmlformats.org/officeDocument/2006/relationships" xmlns:p="http://schemas.openxmlformats.org/presentationml/2006/main">
+  <p:cSld>
+    <p:spTree>
+      <p:nvGrpSpPr>
+        <p:cNvPr id="1" name=""/>
+        <p:cNvGrpSpPr/>
+        <p:nvPr/>
+      </p:nvGrpSpPr>
+      <p:grpSpPr>
+        <a:xfrm>
+          <a:off x="0" y="0"/>
+          <a:ext cx="0" cy="0"/>
+          <a:chOff x="0" y="0"/>
+          <a:chExt cx="0" cy="0"/>
+        </a:xfrm>
+      </p:grpSpPr>
+      <p:sp>
+        <p:nvSpPr>
+          <p:cNvPr id="2" name="Tytuł 1"/>
+          <p:cNvSpPr>
+            <a:spLocks noGrp="1"/>
+          </p:cNvSpPr>
+          <p:nvPr>
+            <p:ph type="title"/>
+          </p:nvPr>
+        </p:nvSpPr>
+        <p:spPr/>
+        <p:txBody>
+          <a:bodyPr/>
+          <a:lstStyle/>
+          <a:p>
+            <a:r>
+              <a:rPr lang="pl-PL" dirty="0" err="1" smtClean="0"/>
+              <a:t>Producer</a:t>
+            </a:r>
+            <a:endParaRPr lang="pl-PL" dirty="0"/>
+          </a:p>
+        </p:txBody>
+      </p:sp>
+      <p:sp>
+        <p:nvSpPr>
+          <p:cNvPr id="3" name="Symbol zastępczy zawartości 2"/>
+          <p:cNvSpPr>
+            <a:spLocks noGrp="1"/>
+          </p:cNvSpPr>
+          <p:nvPr>
+            <p:ph idx="1"/>
+          </p:nvPr>
+        </p:nvSpPr>
+        <p:spPr/>
+        <p:txBody>
+          <a:bodyPr/>
+          <a:lstStyle/>
+          <a:p>
+            <a:endParaRPr lang="pl-PL" dirty="0"/>
+          </a:p>
+        </p:txBody>
+      </p:sp>
+      <p:pic>
+        <p:nvPicPr>
+          <p:cNvPr id="29698" name="Picture 2" descr="http://www.rabbitmq.com/img/tutorials/sending.png"/>
+          <p:cNvPicPr>
+            <a:picLocks noChangeAspect="1" noChangeArrowheads="1"/>
+          </p:cNvPicPr>
+          <p:nvPr/>
+        </p:nvPicPr>
+        <p:blipFill>
+          <a:blip r:embed="rId2" cstate="print"/>
+          <a:srcRect/>
+          <a:stretch>
+            <a:fillRect/>
+          </a:stretch>
+        </p:blipFill>
+        <p:spPr bwMode="auto">
+          <a:xfrm>
+            <a:off x="5724128" y="2996952"/>
+            <a:ext cx="2057400" cy="952500"/>
+          </a:xfrm>
+          <a:prstGeom prst="rect">
+            <a:avLst/>
+          </a:prstGeom>
+          <a:noFill/>
+        </p:spPr>
+      </p:pic>
+      <p:pic>
+        <p:nvPicPr>
+          <p:cNvPr id="29699" name="Picture 3"/>
+          <p:cNvPicPr>
+            <a:picLocks noChangeAspect="1" noChangeArrowheads="1"/>
+          </p:cNvPicPr>
+          <p:nvPr/>
+        </p:nvPicPr>
+        <p:blipFill>
+          <a:blip r:embed="rId3" cstate="print"/>
+          <a:srcRect/>
+          <a:stretch>
+            <a:fillRect/>
+          </a:stretch>
+        </p:blipFill>
+        <p:spPr bwMode="auto">
+          <a:xfrm>
+            <a:off x="611560" y="2253208"/>
+            <a:ext cx="4733925" cy="3048000"/>
+          </a:xfrm>
+          <a:prstGeom prst="rect">
+            <a:avLst/>
+          </a:prstGeom>
+          <a:noFill/>
+          <a:ln w="9525">
+            <a:noFill/>
+            <a:miter lim="800000"/>
+            <a:headEnd/>
+            <a:tailEnd/>
+          </a:ln>
+        </p:spPr>
+      </p:pic>
+    </p:spTree>
+  </p:cSld>
+  <p:clrMapOvr>
+    <a:masterClrMapping/>
+  </p:clrMapOvr>
+  <p:timing>
+    <p:tnLst>
+      <p:par>
+        <p:cTn id="1" dur="indefinite" restart="never" nodeType="tmRoot"/>
+      </p:par>
+    </p:tnLst>
+  </p:timing>
+</p:sld>
+</file>
+
+<file path=ppt/slides/slide13.xml><?xml version="1.0" encoding="utf-8"?>
+<p:sld xmlns:a="http://schemas.openxmlformats.org/drawingml/2006/main" xmlns:r="http://schemas.openxmlformats.org/officeDocument/2006/relationships" xmlns:p="http://schemas.openxmlformats.org/presentationml/2006/main">
+  <p:cSld>
+    <p:spTree>
+      <p:nvGrpSpPr>
+        <p:cNvPr id="1" name=""/>
+        <p:cNvGrpSpPr/>
+        <p:nvPr/>
+      </p:nvGrpSpPr>
+      <p:grpSpPr>
+        <a:xfrm>
+          <a:off x="0" y="0"/>
+          <a:ext cx="0" cy="0"/>
+          <a:chOff x="0" y="0"/>
+          <a:chExt cx="0" cy="0"/>
+        </a:xfrm>
+      </p:grpSpPr>
+      <p:sp>
+        <p:nvSpPr>
+          <p:cNvPr id="2" name="Tytuł 1"/>
+          <p:cNvSpPr>
+            <a:spLocks noGrp="1"/>
+          </p:cNvSpPr>
+          <p:nvPr>
+            <p:ph type="title"/>
+          </p:nvPr>
+        </p:nvSpPr>
+        <p:spPr/>
+        <p:txBody>
+          <a:bodyPr/>
+          <a:lstStyle/>
+          <a:p>
+            <a:r>
+              <a:rPr lang="pl-PL" dirty="0" smtClean="0"/>
+              <a:t>Consumer</a:t>
+            </a:r>
+            <a:endParaRPr lang="pl-PL" dirty="0"/>
+          </a:p>
+        </p:txBody>
+      </p:sp>
+      <p:sp>
+        <p:nvSpPr>
+          <p:cNvPr id="3" name="Symbol zastępczy zawartości 2"/>
+          <p:cNvSpPr>
+            <a:spLocks noGrp="1"/>
+          </p:cNvSpPr>
+          <p:nvPr>
+            <p:ph idx="1"/>
+          </p:nvPr>
+        </p:nvSpPr>
+        <p:spPr/>
+        <p:txBody>
+          <a:bodyPr/>
+          <a:lstStyle/>
+          <a:p>
+            <a:endParaRPr lang="pl-PL"/>
+          </a:p>
+        </p:txBody>
+      </p:sp>
+      <p:pic>
+        <p:nvPicPr>
+          <p:cNvPr id="31746" name="Picture 2" descr="http://www.rabbitmq.com/img/tutorials/receiving.png"/>
+          <p:cNvPicPr>
+            <a:picLocks noChangeAspect="1" noChangeArrowheads="1"/>
+          </p:cNvPicPr>
+          <p:nvPr/>
+        </p:nvPicPr>
+        <p:blipFill>
+          <a:blip r:embed="rId2" cstate="print"/>
+          <a:srcRect/>
+          <a:stretch>
+            <a:fillRect/>
+          </a:stretch>
+        </p:blipFill>
+        <p:spPr bwMode="auto">
+          <a:xfrm>
+            <a:off x="6187008" y="2996952"/>
+            <a:ext cx="2057400" cy="952500"/>
+          </a:xfrm>
+          <a:prstGeom prst="rect">
+            <a:avLst/>
+          </a:prstGeom>
+          <a:noFill/>
+        </p:spPr>
+      </p:pic>
+      <p:pic>
+        <p:nvPicPr>
+          <p:cNvPr id="31747" name="Picture 3"/>
+          <p:cNvPicPr>
+            <a:picLocks noChangeAspect="1" noChangeArrowheads="1"/>
+          </p:cNvPicPr>
+          <p:nvPr/>
+        </p:nvPicPr>
+        <p:blipFill>
+          <a:blip r:embed="rId3" cstate="print"/>
+          <a:srcRect/>
+          <a:stretch>
+            <a:fillRect/>
+          </a:stretch>
+        </p:blipFill>
+        <p:spPr bwMode="auto">
+          <a:xfrm>
+            <a:off x="621010" y="2204864"/>
+            <a:ext cx="5391150" cy="3343275"/>
+          </a:xfrm>
+          <a:prstGeom prst="rect">
+            <a:avLst/>
+          </a:prstGeom>
+          <a:noFill/>
+          <a:ln w="9525">
+            <a:noFill/>
+            <a:miter lim="800000"/>
+            <a:headEnd/>
+            <a:tailEnd/>
+          </a:ln>
+        </p:spPr>
+      </p:pic>
+    </p:spTree>
+  </p:cSld>
+  <p:clrMapOvr>
+    <a:masterClrMapping/>
+  </p:clrMapOvr>
+  <p:timing>
+    <p:tnLst>
+      <p:par>
+        <p:cTn id="1" dur="indefinite" restart="never" nodeType="tmRoot"/>
+      </p:par>
+    </p:tnLst>
+  </p:timing>
+</p:sld>
+</file>
+
+<file path=ppt/slides/slide14.xml><?xml version="1.0" encoding="utf-8"?>
+<p:sld xmlns:a="http://schemas.openxmlformats.org/drawingml/2006/main" xmlns:r="http://schemas.openxmlformats.org/officeDocument/2006/relationships" xmlns:p="http://schemas.openxmlformats.org/presentationml/2006/main">
+  <p:cSld>
+    <p:spTree>
+      <p:nvGrpSpPr>
+        <p:cNvPr id="1" name=""/>
+        <p:cNvGrpSpPr/>
+        <p:nvPr/>
+      </p:nvGrpSpPr>
+      <p:grpSpPr>
+        <a:xfrm>
+          <a:off x="0" y="0"/>
+          <a:ext cx="0" cy="0"/>
+          <a:chOff x="0" y="0"/>
+          <a:chExt cx="0" cy="0"/>
+        </a:xfrm>
+      </p:grpSpPr>
+      <p:sp>
+        <p:nvSpPr>
+          <p:cNvPr id="2" name="Tytuł 1"/>
+          <p:cNvSpPr>
+            <a:spLocks noGrp="1"/>
+          </p:cNvSpPr>
+          <p:nvPr>
+            <p:ph type="title"/>
+          </p:nvPr>
+        </p:nvSpPr>
+        <p:spPr/>
+        <p:txBody>
+          <a:bodyPr/>
+          <a:lstStyle/>
+          <a:p>
+            <a:r>
+              <a:rPr lang="pl-PL" dirty="0" smtClean="0"/>
+              <a:t>Więcej </a:t>
+            </a:r>
+            <a:r>
+              <a:rPr lang="pl-PL" dirty="0" err="1" smtClean="0"/>
+              <a:t>consumerów</a:t>
+            </a:r>
+            <a:endParaRPr lang="pl-PL" dirty="0"/>
+          </a:p>
+        </p:txBody>
+      </p:sp>
+      <p:sp>
+        <p:nvSpPr>
+          <p:cNvPr id="3" name="Symbol zastępczy zawartości 2"/>
+          <p:cNvSpPr>
+            <a:spLocks noGrp="1"/>
+          </p:cNvSpPr>
+          <p:nvPr>
+            <p:ph idx="1"/>
+          </p:nvPr>
+        </p:nvSpPr>
+        <p:spPr>
+          <a:xfrm>
+            <a:off x="457200" y="1711349"/>
+            <a:ext cx="8229600" cy="4525963"/>
+          </a:xfrm>
+        </p:spPr>
+        <p:txBody>
+          <a:bodyPr/>
+          <a:lstStyle/>
+          <a:p>
+            <a:r>
+              <a:rPr lang="pl-PL" b="1" dirty="0" smtClean="0"/>
+              <a:t>Problem: </a:t>
+            </a:r>
+            <a:r>
+              <a:rPr lang="pl-PL" dirty="0" smtClean="0"/>
+              <a:t>jeden </a:t>
+            </a:r>
+            <a:r>
+              <a:rPr lang="pl-PL" dirty="0" err="1" smtClean="0"/>
+              <a:t>producer</a:t>
+            </a:r>
+            <a:r>
+              <a:rPr lang="pl-PL" dirty="0" smtClean="0"/>
+              <a:t> chce wysłać tą samą wiadomość do kilku </a:t>
+            </a:r>
+            <a:r>
+              <a:rPr lang="pl-PL" dirty="0" err="1" smtClean="0"/>
+              <a:t>consumerów</a:t>
+            </a:r>
+            <a:r>
+              <a:rPr lang="pl-PL" dirty="0" smtClean="0"/>
+              <a:t>, którzy mają ją odebrać w tym samym czasie</a:t>
+            </a:r>
+          </a:p>
+          <a:p>
+            <a:endParaRPr lang="pl-PL" dirty="0"/>
+          </a:p>
+        </p:txBody>
+      </p:sp>
+    </p:spTree>
+  </p:cSld>
+  <p:clrMapOvr>
+    <a:masterClrMapping/>
+  </p:clrMapOvr>
+</p:sld>
+</file>
+
+<file path=ppt/slides/slide15.xml><?xml version="1.0" encoding="utf-8"?>
+<p:sld xmlns:a="http://schemas.openxmlformats.org/drawingml/2006/main" xmlns:r="http://schemas.openxmlformats.org/officeDocument/2006/relationships" xmlns:p="http://schemas.openxmlformats.org/presentationml/2006/main">
+  <p:cSld>
+    <p:spTree>
+      <p:nvGrpSpPr>
+        <p:cNvPr id="1" name=""/>
+        <p:cNvGrpSpPr/>
+        <p:nvPr/>
+      </p:nvGrpSpPr>
+      <p:grpSpPr>
+        <a:xfrm>
+          <a:off x="0" y="0"/>
+          <a:ext cx="0" cy="0"/>
+          <a:chOff x="0" y="0"/>
+          <a:chExt cx="0" cy="0"/>
+        </a:xfrm>
+      </p:grpSpPr>
+      <p:sp>
+        <p:nvSpPr>
+          <p:cNvPr id="2" name="Tytuł 1"/>
+          <p:cNvSpPr>
+            <a:spLocks noGrp="1"/>
+          </p:cNvSpPr>
+          <p:nvPr>
+            <p:ph type="title"/>
+          </p:nvPr>
+        </p:nvSpPr>
+        <p:spPr/>
+        <p:txBody>
+          <a:bodyPr/>
+          <a:lstStyle/>
+          <a:p>
+            <a:r>
+              <a:rPr lang="pl-PL" dirty="0" smtClean="0"/>
+              <a:t>Exchange</a:t>
+            </a:r>
+            <a:endParaRPr lang="pl-PL" dirty="0"/>
+          </a:p>
+        </p:txBody>
+      </p:sp>
+      <p:sp>
+        <p:nvSpPr>
+          <p:cNvPr id="3" name="Symbol zastępczy zawartości 2"/>
+          <p:cNvSpPr>
+            <a:spLocks noGrp="1"/>
+          </p:cNvSpPr>
+          <p:nvPr>
+            <p:ph idx="1"/>
+          </p:nvPr>
+        </p:nvSpPr>
+        <p:spPr/>
+        <p:txBody>
+          <a:bodyPr/>
+          <a:lstStyle/>
+          <a:p>
+            <a:r>
+              <a:rPr lang="pl-PL" dirty="0" smtClean="0"/>
+              <a:t>Pośrednik w wysyłaniu wiadomości do kolejki</a:t>
+            </a:r>
+          </a:p>
+          <a:p>
+            <a:r>
+              <a:rPr lang="pl-PL" dirty="0" smtClean="0"/>
+              <a:t>Duże ułatwienie</a:t>
+            </a:r>
+          </a:p>
+          <a:p>
+            <a:r>
+              <a:rPr lang="pl-PL" dirty="0" smtClean="0"/>
+              <a:t>Odpowiada za dalszy los wiadomości</a:t>
+            </a:r>
+          </a:p>
+          <a:p>
+            <a:r>
+              <a:rPr lang="pl-PL" dirty="0" smtClean="0"/>
+              <a:t>Połączona z kolejkami za pomocą wiązań (</a:t>
+            </a:r>
+            <a:r>
+              <a:rPr lang="pl-PL" dirty="0" err="1" smtClean="0"/>
+              <a:t>bindings</a:t>
+            </a:r>
+            <a:r>
+              <a:rPr lang="pl-PL" dirty="0" smtClean="0"/>
+              <a:t>)</a:t>
+            </a:r>
+          </a:p>
+          <a:p>
+            <a:r>
+              <a:rPr lang="pl-PL" dirty="0" smtClean="0"/>
+              <a:t>Wiązania posiadają </a:t>
+            </a:r>
+            <a:r>
+              <a:rPr lang="pl-PL" dirty="0" err="1" smtClean="0"/>
+              <a:t>routing_key</a:t>
+            </a:r>
+            <a:r>
+              <a:rPr lang="pl-PL" dirty="0" smtClean="0"/>
+              <a:t> określający </a:t>
+            </a:r>
+            <a:r>
+              <a:rPr lang="pl-PL" dirty="0" err="1" smtClean="0"/>
+              <a:t>pattern</a:t>
+            </a:r>
+            <a:r>
+              <a:rPr lang="pl-PL" dirty="0" smtClean="0"/>
+              <a:t> wiadomości, którą mogą „przenieść” do kolejki</a:t>
+            </a:r>
+          </a:p>
+        </p:txBody>
+      </p:sp>
+      <p:pic>
+        <p:nvPicPr>
+          <p:cNvPr id="4" name="Picture 2" descr="http://www.rabbitmq.com/img/tutorials/bindings.png"/>
+          <p:cNvPicPr>
+            <a:picLocks noChangeAspect="1" noChangeArrowheads="1"/>
+          </p:cNvPicPr>
+          <p:nvPr/>
+        </p:nvPicPr>
+        <p:blipFill>
+          <a:blip r:embed="rId2" cstate="print"/>
+          <a:srcRect/>
+          <a:stretch>
+            <a:fillRect/>
+          </a:stretch>
+        </p:blipFill>
+        <p:spPr bwMode="auto">
+          <a:xfrm>
+            <a:off x="2987824" y="5085184"/>
+            <a:ext cx="3067050" cy="866776"/>
+          </a:xfrm>
+          <a:prstGeom prst="rect">
+            <a:avLst/>
+          </a:prstGeom>
+          <a:noFill/>
+        </p:spPr>
+      </p:pic>
+    </p:spTree>
+  </p:cSld>
+  <p:clrMapOvr>
+    <a:masterClrMapping/>
+  </p:clrMapOvr>
+  <p:timing>
+    <p:tnLst>
+      <p:par>
+        <p:cTn id="1" dur="indefinite" restart="never" nodeType="tmRoot"/>
+      </p:par>
+    </p:tnLst>
+  </p:timing>
+</p:sld>
+</file>
+
+<file path=ppt/slides/slide16.xml><?xml version="1.0" encoding="utf-8"?>
+<p:sld xmlns:a="http://schemas.openxmlformats.org/drawingml/2006/main" xmlns:r="http://schemas.openxmlformats.org/officeDocument/2006/relationships" xmlns:p="http://schemas.openxmlformats.org/presentationml/2006/main">
+  <p:cSld>
+    <p:spTree>
+      <p:nvGrpSpPr>
+        <p:cNvPr id="1" name=""/>
+        <p:cNvGrpSpPr/>
+        <p:nvPr/>
+      </p:nvGrpSpPr>
+      <p:grpSpPr>
+        <a:xfrm>
+          <a:off x="0" y="0"/>
+          <a:ext cx="0" cy="0"/>
+          <a:chOff x="0" y="0"/>
+          <a:chExt cx="0" cy="0"/>
+        </a:xfrm>
+      </p:grpSpPr>
+      <p:sp>
+        <p:nvSpPr>
+          <p:cNvPr id="2" name="Tytuł 1"/>
+          <p:cNvSpPr>
+            <a:spLocks noGrp="1"/>
+          </p:cNvSpPr>
+          <p:nvPr>
+            <p:ph type="title"/>
+          </p:nvPr>
+        </p:nvSpPr>
+        <p:spPr/>
+        <p:txBody>
+          <a:bodyPr/>
+          <a:lstStyle/>
+          <a:p>
+            <a:r>
+              <a:rPr lang="pl-PL" dirty="0" smtClean="0"/>
+              <a:t>Exchange</a:t>
+            </a:r>
+            <a:endParaRPr lang="pl-PL" dirty="0"/>
+          </a:p>
+        </p:txBody>
+      </p:sp>
+      <p:sp>
+        <p:nvSpPr>
+          <p:cNvPr id="3" name="Symbol zastępczy zawartości 2"/>
+          <p:cNvSpPr>
+            <a:spLocks noGrp="1"/>
+          </p:cNvSpPr>
+          <p:nvPr>
+            <p:ph idx="1"/>
+          </p:nvPr>
+        </p:nvSpPr>
+        <p:spPr/>
+        <p:txBody>
+          <a:bodyPr/>
+          <a:lstStyle/>
+          <a:p>
+            <a:r>
+              <a:rPr lang="pl-PL" dirty="0" smtClean="0"/>
+              <a:t>W zależności od typu, </a:t>
+            </a:r>
+            <a:r>
+              <a:rPr lang="pl-PL" dirty="0" err="1" smtClean="0"/>
+              <a:t>exchange</a:t>
+            </a:r>
+            <a:r>
+              <a:rPr lang="pl-PL" dirty="0" smtClean="0"/>
+              <a:t> rozsyła wiadomości w różny </a:t>
+            </a:r>
+            <a:r>
+              <a:rPr lang="pl-PL" dirty="0" smtClean="0"/>
+              <a:t>sposób:</a:t>
+            </a:r>
+          </a:p>
+          <a:p>
+            <a:pPr lvl="1"/>
+            <a:r>
+              <a:rPr lang="pl-PL" dirty="0" err="1" smtClean="0"/>
+              <a:t>Fanout</a:t>
+            </a:r>
+            <a:r>
+              <a:rPr lang="pl-PL" dirty="0" smtClean="0"/>
+              <a:t> – do wszystkich kolejek związanych z </a:t>
+            </a:r>
+            <a:r>
+              <a:rPr lang="pl-PL" dirty="0" err="1" smtClean="0"/>
+              <a:t>exchange</a:t>
+            </a:r>
+            <a:endParaRPr lang="pl-PL" dirty="0" smtClean="0"/>
+          </a:p>
+          <a:p>
+            <a:pPr lvl="1"/>
+            <a:r>
+              <a:rPr lang="pl-PL" dirty="0" err="1" smtClean="0"/>
+              <a:t>Direct</a:t>
+            </a:r>
+            <a:r>
+              <a:rPr lang="pl-PL" dirty="0" smtClean="0"/>
+              <a:t> – aby wiadomość została wysłana do kolejki, wiadomość musi mieć </a:t>
+            </a:r>
+            <a:r>
+              <a:rPr lang="pl-PL" dirty="0" err="1" smtClean="0"/>
+              <a:t>routing_key</a:t>
+            </a:r>
+            <a:r>
+              <a:rPr lang="pl-PL" dirty="0" smtClean="0"/>
+              <a:t> takie jak wiązanie (</a:t>
+            </a:r>
+            <a:r>
+              <a:rPr lang="pl-PL" dirty="0" err="1" smtClean="0"/>
+              <a:t>binding</a:t>
+            </a:r>
+            <a:r>
+              <a:rPr lang="pl-PL" dirty="0" smtClean="0"/>
+              <a:t>)</a:t>
+            </a:r>
+          </a:p>
+          <a:p>
+            <a:pPr lvl="1"/>
+            <a:r>
+              <a:rPr lang="pl-PL" dirty="0" err="1" smtClean="0"/>
+              <a:t>Topic</a:t>
+            </a:r>
+            <a:r>
+              <a:rPr lang="pl-PL" dirty="0" smtClean="0"/>
+              <a:t> – jak wyżej, ale </a:t>
+            </a:r>
+            <a:r>
+              <a:rPr lang="pl-PL" dirty="0" err="1" smtClean="0"/>
+              <a:t>routing_key</a:t>
+            </a:r>
+            <a:r>
+              <a:rPr lang="pl-PL" dirty="0" smtClean="0"/>
+              <a:t> nie musi być identyczny, a </a:t>
+            </a:r>
+            <a:r>
+              <a:rPr lang="pl-PL" dirty="0" err="1" smtClean="0"/>
+              <a:t>matchować</a:t>
+            </a:r>
+            <a:r>
+              <a:rPr lang="pl-PL" dirty="0" smtClean="0"/>
+              <a:t> się do wzorca</a:t>
+            </a:r>
+            <a:endParaRPr lang="pl-PL" dirty="0"/>
+          </a:p>
+        </p:txBody>
+      </p:sp>
+      <p:pic>
+        <p:nvPicPr>
+          <p:cNvPr id="4" name="Picture 2" descr="http://www.rabbitmq.com/img/tutorials/bindings.png"/>
+          <p:cNvPicPr>
+            <a:picLocks noChangeAspect="1" noChangeArrowheads="1"/>
+          </p:cNvPicPr>
+          <p:nvPr/>
+        </p:nvPicPr>
+        <p:blipFill>
+          <a:blip r:embed="rId2" cstate="print"/>
+          <a:srcRect/>
+          <a:stretch>
+            <a:fillRect/>
+          </a:stretch>
+        </p:blipFill>
+        <p:spPr bwMode="auto">
+          <a:xfrm>
+            <a:off x="2987824" y="5085184"/>
+            <a:ext cx="3067050" cy="866776"/>
+          </a:xfrm>
+          <a:prstGeom prst="rect">
+            <a:avLst/>
+          </a:prstGeom>
+          <a:noFill/>
+        </p:spPr>
+      </p:pic>
+    </p:spTree>
+  </p:cSld>
+  <p:clrMapOvr>
+    <a:masterClrMapping/>
+  </p:clrMapOvr>
+  <p:timing>
+    <p:tnLst>
+      <p:par>
+        <p:cTn id="1" dur="indefinite" restart="never" nodeType="tmRoot"/>
+      </p:par>
+    </p:tnLst>
+  </p:timing>
+</p:sld>
+</file>
+
+<file path=ppt/slides/slide17.xml><?xml version="1.0" encoding="utf-8"?>
+<p:sld xmlns:a="http://schemas.openxmlformats.org/drawingml/2006/main" xmlns:r="http://schemas.openxmlformats.org/officeDocument/2006/relationships" xmlns:p="http://schemas.openxmlformats.org/presentationml/2006/main">
+  <p:cSld>
+    <p:spTree>
+      <p:nvGrpSpPr>
+        <p:cNvPr id="1" name=""/>
+        <p:cNvGrpSpPr/>
+        <p:nvPr/>
+      </p:nvGrpSpPr>
+      <p:grpSpPr>
+        <a:xfrm>
+          <a:off x="0" y="0"/>
+          <a:ext cx="0" cy="0"/>
+          <a:chOff x="0" y="0"/>
+          <a:chExt cx="0" cy="0"/>
+        </a:xfrm>
+      </p:grpSpPr>
+      <p:sp>
+        <p:nvSpPr>
+          <p:cNvPr id="2" name="Tytuł 1"/>
+          <p:cNvSpPr>
+            <a:spLocks noGrp="1"/>
+          </p:cNvSpPr>
+          <p:nvPr>
+            <p:ph type="title"/>
+          </p:nvPr>
+        </p:nvSpPr>
+        <p:spPr/>
+        <p:txBody>
+          <a:bodyPr/>
+          <a:lstStyle/>
+          <a:p>
+            <a:r>
+              <a:rPr lang="pl-PL" dirty="0" smtClean="0"/>
+              <a:t>Elementy</a:t>
+            </a:r>
+            <a:endParaRPr lang="pl-PL" dirty="0"/>
+          </a:p>
+        </p:txBody>
+      </p:sp>
+      <p:pic>
+        <p:nvPicPr>
+          <p:cNvPr id="1026" name="Picture 2" descr="http://www.rabbitmq.com/img/tutorials/producer.png"/>
+          <p:cNvPicPr>
+            <a:picLocks noChangeAspect="1" noChangeArrowheads="1"/>
+          </p:cNvPicPr>
+          <p:nvPr/>
+        </p:nvPicPr>
+        <p:blipFill>
+          <a:blip r:embed="rId2" cstate="print"/>
+          <a:srcRect/>
+          <a:stretch>
+            <a:fillRect/>
+          </a:stretch>
+        </p:blipFill>
+        <p:spPr bwMode="auto">
+          <a:xfrm>
+            <a:off x="2466392" y="2439169"/>
+            <a:ext cx="676275" cy="485775"/>
+          </a:xfrm>
+          <a:prstGeom prst="rect">
+            <a:avLst/>
+          </a:prstGeom>
+          <a:noFill/>
+        </p:spPr>
+      </p:pic>
+      <p:pic>
+        <p:nvPicPr>
+          <p:cNvPr id="1028" name="Picture 4" descr="http://www.rabbitmq.com/img/tutorials/queue.png"/>
+          <p:cNvPicPr>
+            <a:picLocks noChangeAspect="1" noChangeArrowheads="1"/>
+          </p:cNvPicPr>
+          <p:nvPr/>
+        </p:nvPicPr>
+        <p:blipFill>
+          <a:blip r:embed="rId3" cstate="print"/>
+          <a:srcRect/>
+          <a:stretch>
+            <a:fillRect/>
+          </a:stretch>
+        </p:blipFill>
+        <p:spPr bwMode="auto">
+          <a:xfrm>
+            <a:off x="2253630" y="4074392"/>
+            <a:ext cx="1238250" cy="866776"/>
+          </a:xfrm>
+          <a:prstGeom prst="rect">
+            <a:avLst/>
+          </a:prstGeom>
+          <a:noFill/>
+        </p:spPr>
+      </p:pic>
+      <p:pic>
+        <p:nvPicPr>
+          <p:cNvPr id="1030" name="Picture 6" descr="http://www.rabbitmq.com/img/tutorials/consumer.png"/>
+          <p:cNvPicPr>
+            <a:picLocks noChangeAspect="1" noChangeArrowheads="1"/>
+          </p:cNvPicPr>
+          <p:nvPr/>
+        </p:nvPicPr>
+        <p:blipFill>
+          <a:blip r:embed="rId4" cstate="print"/>
+          <a:srcRect/>
+          <a:stretch>
+            <a:fillRect/>
+          </a:stretch>
+        </p:blipFill>
+        <p:spPr bwMode="auto">
+          <a:xfrm>
+            <a:off x="2466392" y="5373216"/>
+            <a:ext cx="676275" cy="485775"/>
+          </a:xfrm>
+          <a:prstGeom prst="rect">
+            <a:avLst/>
+          </a:prstGeom>
+          <a:noFill/>
+        </p:spPr>
+      </p:pic>
+      <p:sp>
+        <p:nvSpPr>
+          <p:cNvPr id="7" name="pole tekstowe 6"/>
+          <p:cNvSpPr txBox="1"/>
+          <p:nvPr/>
+        </p:nvSpPr>
+        <p:spPr>
+          <a:xfrm>
+            <a:off x="3468594" y="2501885"/>
+            <a:ext cx="3299301" cy="369332"/>
+          </a:xfrm>
+          <a:prstGeom prst="rect">
+            <a:avLst/>
+          </a:prstGeom>
+          <a:noFill/>
+        </p:spPr>
+        <p:txBody>
+          <a:bodyPr wrap="none" rtlCol="0">
+            <a:spAutoFit/>
+          </a:bodyPr>
+          <a:lstStyle/>
+          <a:p>
+            <a:pPr algn="ctr"/>
+            <a:r>
+              <a:rPr lang="pl-PL" dirty="0" err="1" smtClean="0"/>
+              <a:t>Producer</a:t>
+            </a:r>
+            <a:r>
+              <a:rPr lang="pl-PL" dirty="0" smtClean="0"/>
+              <a:t> (wysyła wiadomość)</a:t>
+            </a:r>
+            <a:endParaRPr lang="pl-PL" dirty="0"/>
+          </a:p>
+        </p:txBody>
+      </p:sp>
+      <p:sp>
+        <p:nvSpPr>
+          <p:cNvPr id="8" name="pole tekstowe 7"/>
+          <p:cNvSpPr txBox="1"/>
+          <p:nvPr/>
+        </p:nvSpPr>
+        <p:spPr>
+          <a:xfrm>
+            <a:off x="3510667" y="4412729"/>
+            <a:ext cx="3200107" cy="369332"/>
+          </a:xfrm>
+          <a:prstGeom prst="rect">
+            <a:avLst/>
+          </a:prstGeom>
+        </p:spPr>
+        <p:txBody>
+          <a:bodyPr wrap="none" rtlCol="0">
+            <a:spAutoFit/>
+          </a:bodyPr>
+          <a:lstStyle/>
+          <a:p>
+            <a:pPr algn="ctr"/>
+            <a:r>
+              <a:rPr lang="pl-PL" dirty="0" err="1" smtClean="0"/>
+              <a:t>Queue</a:t>
+            </a:r>
+            <a:r>
+              <a:rPr lang="pl-PL" dirty="0" smtClean="0"/>
+              <a:t> (kolejka priorytetowa)</a:t>
+            </a:r>
+            <a:endParaRPr lang="pl-PL" dirty="0"/>
+          </a:p>
+        </p:txBody>
+      </p:sp>
+      <p:sp>
+        <p:nvSpPr>
+          <p:cNvPr id="9" name="Symbol zastępczy zawartości 8"/>
+          <p:cNvSpPr txBox="1">
+            <a:spLocks noGrp="1"/>
+          </p:cNvSpPr>
+          <p:nvPr>
+            <p:ph idx="1"/>
+          </p:nvPr>
+        </p:nvSpPr>
+        <p:spPr>
+          <a:xfrm>
+            <a:off x="457200" y="1600200"/>
+            <a:ext cx="530915" cy="461665"/>
+          </a:xfrm>
+          <a:prstGeom prst="rect">
+            <a:avLst/>
+          </a:prstGeom>
+          <a:noFill/>
+        </p:spPr>
+        <p:txBody>
+          <a:bodyPr wrap="none" rtlCol="0">
+            <a:spAutoFit/>
+          </a:bodyPr>
+          <a:lstStyle/>
+          <a:p>
+            <a:endParaRPr lang="pl-PL" dirty="0"/>
+          </a:p>
+        </p:txBody>
+      </p:sp>
+      <p:sp>
+        <p:nvSpPr>
+          <p:cNvPr id="11" name="pole tekstowe 10"/>
+          <p:cNvSpPr txBox="1"/>
+          <p:nvPr/>
+        </p:nvSpPr>
+        <p:spPr>
+          <a:xfrm>
+            <a:off x="3414813" y="5445224"/>
+            <a:ext cx="3475631" cy="369332"/>
+          </a:xfrm>
+          <a:prstGeom prst="rect">
+            <a:avLst/>
+          </a:prstGeom>
+        </p:spPr>
+        <p:txBody>
+          <a:bodyPr wrap="none" rtlCol="0">
+            <a:spAutoFit/>
+          </a:bodyPr>
+          <a:lstStyle/>
+          <a:p>
+            <a:pPr algn="ctr"/>
+            <a:r>
+              <a:rPr lang="pl-PL" dirty="0" smtClean="0"/>
+              <a:t>Consumer (odbiera wiadomość)</a:t>
+            </a:r>
+            <a:endParaRPr lang="pl-PL" dirty="0"/>
+          </a:p>
+        </p:txBody>
+      </p:sp>
+      <p:pic>
+        <p:nvPicPr>
+          <p:cNvPr id="1031" name="Picture 7"/>
+          <p:cNvPicPr>
+            <a:picLocks noChangeAspect="1" noChangeArrowheads="1"/>
+          </p:cNvPicPr>
+          <p:nvPr/>
+        </p:nvPicPr>
+        <p:blipFill>
+          <a:blip r:embed="rId5" cstate="print"/>
+          <a:srcRect/>
+          <a:stretch>
+            <a:fillRect/>
+          </a:stretch>
+        </p:blipFill>
+        <p:spPr bwMode="auto">
+          <a:xfrm>
+            <a:off x="2502818" y="3331840"/>
+            <a:ext cx="609600" cy="457200"/>
+          </a:xfrm>
+          <a:prstGeom prst="rect">
+            <a:avLst/>
+          </a:prstGeom>
+          <a:noFill/>
+          <a:ln w="9525">
+            <a:noFill/>
+            <a:miter lim="800000"/>
+            <a:headEnd/>
+            <a:tailEnd/>
+          </a:ln>
+        </p:spPr>
+      </p:pic>
+      <p:sp>
+        <p:nvSpPr>
+          <p:cNvPr id="13" name="pole tekstowe 12"/>
+          <p:cNvSpPr txBox="1"/>
+          <p:nvPr/>
+        </p:nvSpPr>
+        <p:spPr>
+          <a:xfrm>
+            <a:off x="3310730" y="3286725"/>
+            <a:ext cx="3637534" cy="646331"/>
+          </a:xfrm>
+          <a:prstGeom prst="rect">
+            <a:avLst/>
+          </a:prstGeom>
+          <a:noFill/>
+        </p:spPr>
+        <p:txBody>
+          <a:bodyPr wrap="none" rtlCol="0">
+            <a:spAutoFit/>
+          </a:bodyPr>
+          <a:lstStyle/>
+          <a:p>
+            <a:pPr algn="ctr"/>
+            <a:r>
+              <a:rPr lang="pl-PL" dirty="0" smtClean="0"/>
+              <a:t>Exchange(pośredniczy wymianie </a:t>
+            </a:r>
+          </a:p>
+          <a:p>
+            <a:pPr algn="ctr"/>
+            <a:r>
+              <a:rPr lang="pl-PL" dirty="0" err="1" smtClean="0"/>
+              <a:t>producer-queue</a:t>
+            </a:r>
+            <a:r>
+              <a:rPr lang="pl-PL" dirty="0" smtClean="0"/>
+              <a:t>)</a:t>
+            </a:r>
+            <a:endParaRPr lang="pl-PL" dirty="0"/>
+          </a:p>
+        </p:txBody>
+      </p:sp>
+    </p:spTree>
+  </p:cSld>
+  <p:clrMapOvr>
+    <a:masterClrMapping/>
+  </p:clrMapOvr>
+  <p:timing>
+    <p:tnLst>
+      <p:par>
+        <p:cTn id="1" dur="indefinite" restart="never" nodeType="tmRoot"/>
+      </p:par>
+    </p:tnLst>
+  </p:timing>
+</p:sld>
+</file>
+
+<file path=ppt/slides/slide18.xml><?xml version="1.0" encoding="utf-8"?>
+<p:sld xmlns:a="http://schemas.openxmlformats.org/drawingml/2006/main" xmlns:r="http://schemas.openxmlformats.org/officeDocument/2006/relationships" xmlns:p="http://schemas.openxmlformats.org/presentationml/2006/main">
+  <p:cSld>
+    <p:spTree>
+      <p:nvGrpSpPr>
+        <p:cNvPr id="1" name=""/>
+        <p:cNvGrpSpPr/>
+        <p:nvPr/>
+      </p:nvGrpSpPr>
+      <p:grpSpPr>
+        <a:xfrm>
+          <a:off x="0" y="0"/>
+          <a:ext cx="0" cy="0"/>
+          <a:chOff x="0" y="0"/>
+          <a:chExt cx="0" cy="0"/>
+        </a:xfrm>
+      </p:grpSpPr>
+      <p:sp>
+        <p:nvSpPr>
+          <p:cNvPr id="2" name="Tytuł 1"/>
+          <p:cNvSpPr>
+            <a:spLocks noGrp="1"/>
+          </p:cNvSpPr>
+          <p:nvPr>
+            <p:ph type="title"/>
+          </p:nvPr>
+        </p:nvSpPr>
+        <p:spPr/>
+        <p:txBody>
+          <a:bodyPr/>
+          <a:lstStyle/>
+          <a:p>
+            <a:r>
+              <a:rPr lang="pl-PL" dirty="0" err="1" smtClean="0"/>
+              <a:t>Publih</a:t>
+            </a:r>
+            <a:r>
+              <a:rPr lang="pl-PL" dirty="0" smtClean="0"/>
+              <a:t>/</a:t>
+            </a:r>
+            <a:r>
+              <a:rPr lang="pl-PL" dirty="0" err="1" smtClean="0"/>
+              <a:t>subscribe</a:t>
+            </a:r>
+            <a:endParaRPr lang="pl-PL" dirty="0"/>
+          </a:p>
+        </p:txBody>
+      </p:sp>
+      <p:sp>
+        <p:nvSpPr>
+          <p:cNvPr id="3" name="Symbol zastępczy zawartości 2"/>
+          <p:cNvSpPr>
+            <a:spLocks noGrp="1"/>
+          </p:cNvSpPr>
+          <p:nvPr>
+            <p:ph idx="1"/>
+          </p:nvPr>
+        </p:nvSpPr>
+        <p:spPr/>
+        <p:txBody>
+          <a:bodyPr/>
+          <a:lstStyle/>
+          <a:p>
+            <a:endParaRPr lang="pl-PL" dirty="0"/>
+          </a:p>
+        </p:txBody>
+      </p:sp>
+      <p:pic>
+        <p:nvPicPr>
+          <p:cNvPr id="34820" name="Picture 4" descr="http://www.rabbitmq.com/img/tutorials/python-three-overall.png"/>
+          <p:cNvPicPr>
+            <a:picLocks noChangeAspect="1" noChangeArrowheads="1"/>
+          </p:cNvPicPr>
+          <p:nvPr/>
+        </p:nvPicPr>
+        <p:blipFill>
+          <a:blip r:embed="rId3" cstate="print"/>
+          <a:srcRect/>
+          <a:stretch>
+            <a:fillRect/>
+          </a:stretch>
+        </p:blipFill>
+        <p:spPr bwMode="auto">
+          <a:xfrm>
+            <a:off x="2843808" y="2924944"/>
+            <a:ext cx="3133725" cy="1524001"/>
+          </a:xfrm>
+          <a:prstGeom prst="rect">
+            <a:avLst/>
+          </a:prstGeom>
+          <a:noFill/>
+        </p:spPr>
+      </p:pic>
+    </p:spTree>
+  </p:cSld>
+  <p:clrMapOvr>
+    <a:masterClrMapping/>
+  </p:clrMapOvr>
+  <p:timing>
+    <p:tnLst>
+      <p:par>
+        <p:cTn id="1" dur="indefinite" restart="never" nodeType="tmRoot"/>
+      </p:par>
+    </p:tnLst>
+  </p:timing>
+</p:sld>
+</file>
+
+<file path=ppt/slides/slide19.xml><?xml version="1.0" encoding="utf-8"?>
+<p:sld xmlns:a="http://schemas.openxmlformats.org/drawingml/2006/main" xmlns:r="http://schemas.openxmlformats.org/officeDocument/2006/relationships" xmlns:p="http://schemas.openxmlformats.org/presentationml/2006/main">
+  <p:cSld>
+    <p:spTree>
+      <p:nvGrpSpPr>
+        <p:cNvPr id="1" name=""/>
+        <p:cNvGrpSpPr/>
+        <p:nvPr/>
+      </p:nvGrpSpPr>
+      <p:grpSpPr>
+        <a:xfrm>
+          <a:off x="0" y="0"/>
+          <a:ext cx="0" cy="0"/>
+          <a:chOff x="0" y="0"/>
+          <a:chExt cx="0" cy="0"/>
+        </a:xfrm>
+      </p:grpSpPr>
+      <p:sp>
+        <p:nvSpPr>
+          <p:cNvPr id="2" name="Tytuł 1"/>
+          <p:cNvSpPr>
+            <a:spLocks noGrp="1"/>
+          </p:cNvSpPr>
+          <p:nvPr>
+            <p:ph type="title"/>
+          </p:nvPr>
+        </p:nvSpPr>
+        <p:spPr/>
+        <p:txBody>
+          <a:bodyPr/>
+          <a:lstStyle/>
+          <a:p>
+            <a:r>
+              <a:rPr lang="pl-PL" dirty="0" err="1" smtClean="0"/>
+              <a:t>Routing</a:t>
+            </a:r>
+            <a:endParaRPr lang="pl-PL" dirty="0"/>
+          </a:p>
+        </p:txBody>
+      </p:sp>
+      <p:sp>
+        <p:nvSpPr>
+          <p:cNvPr id="3" name="Symbol zastępczy zawartości 2"/>
+          <p:cNvSpPr>
+            <a:spLocks noGrp="1"/>
+          </p:cNvSpPr>
+          <p:nvPr>
+            <p:ph idx="1"/>
+          </p:nvPr>
+        </p:nvSpPr>
+        <p:spPr/>
+        <p:txBody>
+          <a:bodyPr/>
+          <a:lstStyle/>
+          <a:p>
+            <a:endParaRPr lang="pl-PL"/>
+          </a:p>
+        </p:txBody>
+      </p:sp>
+      <p:pic>
+        <p:nvPicPr>
+          <p:cNvPr id="38914" name="Picture 2" descr="http://www.rabbitmq.com/img/tutorials/direct-exchange.png"/>
+          <p:cNvPicPr>
+            <a:picLocks noChangeAspect="1" noChangeArrowheads="1"/>
+          </p:cNvPicPr>
+          <p:nvPr/>
+        </p:nvPicPr>
+        <p:blipFill>
+          <a:blip r:embed="rId3" cstate="print"/>
+          <a:srcRect/>
+          <a:stretch>
+            <a:fillRect/>
+          </a:stretch>
+        </p:blipFill>
+        <p:spPr bwMode="auto">
+          <a:xfrm>
+            <a:off x="2486000" y="2808336"/>
+            <a:ext cx="3886200" cy="1628776"/>
+          </a:xfrm>
+          <a:prstGeom prst="rect">
+            <a:avLst/>
+          </a:prstGeom>
+          <a:noFill/>
+        </p:spPr>
+      </p:pic>
+    </p:spTree>
+  </p:cSld>
+  <p:clrMapOvr>
+    <a:masterClrMapping/>
+  </p:clrMapOvr>
+  <p:timing>
+    <p:tnLst>
+      <p:par>
+        <p:cTn id="1" dur="indefinite" restart="never" nodeType="tmRoot"/>
+      </p:par>
+    </p:tnLst>
+  </p:timing>
 </p:sld>
 </file>
 
@@ -4991,23 +7328,23 @@
             <a:pPr algn="ctr"/>
             <a:r>
               <a:rPr lang="pl-PL" sz="2800" dirty="0" smtClean="0"/>
-              <a:t>Jest </a:t>
-            </a:r>
-            <a:r>
-              <a:rPr lang="pl-PL" sz="2800" dirty="0"/>
-              <a:t>aplikacją typu </a:t>
-            </a:r>
-            <a:r>
-              <a:rPr lang="pl-PL" sz="2800" b="1" dirty="0" err="1"/>
+              <a:t>Aplikacja typu </a:t>
+            </a:r>
+            <a:r>
+              <a:rPr lang="pl-PL" sz="2800" b="1" dirty="0" err="1" smtClean="0"/>
               <a:t>message</a:t>
             </a:r>
             <a:r>
+              <a:rPr lang="pl-PL" sz="2800" b="1" dirty="0" smtClean="0"/>
+              <a:t> </a:t>
+            </a:r>
+            <a:r>
               <a:rPr lang="pl-PL" sz="2800" b="1" dirty="0"/>
-              <a:t> broker </a:t>
+              <a:t>broker </a:t>
             </a:r>
             <a:r>
               <a:rPr lang="pl-PL" sz="2800" dirty="0" smtClean="0"/>
-              <a:t>opartą </a:t>
+              <a:t>oparta </a:t>
             </a:r>
             <a:r>
               <a:rPr lang="pl-PL" sz="2800" dirty="0"/>
@@ -5047,9 +7384,254 @@
     </p:spTree>
     <p:extLst>
       <p:ext uri="{BB962C8B-B14F-4D97-AF65-F5344CB8AC3E}">
-        <p14:creationId xmlns:p14="http://schemas.microsoft.com/office/powerpoint/2010/main" val="311196185"/>
+        <p14:creationId xmlns:p14="http://schemas.microsoft.com/office/powerpoint/2010/main" xmlns="" val="311196185"/>
       </p:ext>
     </p:extLst>
+  </p:cSld>
+  <p:clrMapOvr>
+    <a:masterClrMapping/>
+  </p:clrMapOvr>
+  <p:timing>
+    <p:tnLst>
+      <p:par>
+        <p:cTn id="1" dur="indefinite" restart="never" nodeType="tmRoot"/>
+      </p:par>
+    </p:tnLst>
+  </p:timing>
+</p:sld>
+</file>
+
+<file path=ppt/slides/slide20.xml><?xml version="1.0" encoding="utf-8"?>
+<p:sld xmlns:a="http://schemas.openxmlformats.org/drawingml/2006/main" xmlns:r="http://schemas.openxmlformats.org/officeDocument/2006/relationships" xmlns:p="http://schemas.openxmlformats.org/presentationml/2006/main">
+  <p:cSld>
+    <p:spTree>
+      <p:nvGrpSpPr>
+        <p:cNvPr id="1" name=""/>
+        <p:cNvGrpSpPr/>
+        <p:nvPr/>
+      </p:nvGrpSpPr>
+      <p:grpSpPr>
+        <a:xfrm>
+          <a:off x="0" y="0"/>
+          <a:ext cx="0" cy="0"/>
+          <a:chOff x="0" y="0"/>
+          <a:chExt cx="0" cy="0"/>
+        </a:xfrm>
+      </p:grpSpPr>
+      <p:sp>
+        <p:nvSpPr>
+          <p:cNvPr id="2" name="Tytuł 1"/>
+          <p:cNvSpPr>
+            <a:spLocks noGrp="1"/>
+          </p:cNvSpPr>
+          <p:nvPr>
+            <p:ph type="title"/>
+          </p:nvPr>
+        </p:nvSpPr>
+        <p:spPr/>
+        <p:txBody>
+          <a:bodyPr/>
+          <a:lstStyle/>
+          <a:p>
+            <a:r>
+              <a:rPr lang="pl-PL" dirty="0" err="1" smtClean="0"/>
+              <a:t>Topics</a:t>
+            </a:r>
+            <a:endParaRPr lang="pl-PL" dirty="0"/>
+          </a:p>
+        </p:txBody>
+      </p:sp>
+      <p:sp>
+        <p:nvSpPr>
+          <p:cNvPr id="3" name="Symbol zastępczy zawartości 2"/>
+          <p:cNvSpPr>
+            <a:spLocks noGrp="1"/>
+          </p:cNvSpPr>
+          <p:nvPr>
+            <p:ph idx="1"/>
+          </p:nvPr>
+        </p:nvSpPr>
+        <p:spPr/>
+        <p:txBody>
+          <a:bodyPr/>
+          <a:lstStyle/>
+          <a:p>
+            <a:endParaRPr lang="pl-PL" dirty="0"/>
+          </a:p>
+        </p:txBody>
+      </p:sp>
+      <p:pic>
+        <p:nvPicPr>
+          <p:cNvPr id="39938" name="Picture 2" descr="http://www.rabbitmq.com/img/tutorials/python-five.png"/>
+          <p:cNvPicPr>
+            <a:picLocks noChangeAspect="1" noChangeArrowheads="1"/>
+          </p:cNvPicPr>
+          <p:nvPr/>
+        </p:nvPicPr>
+        <p:blipFill>
+          <a:blip r:embed="rId2" cstate="print"/>
+          <a:srcRect/>
+          <a:stretch>
+            <a:fillRect/>
+          </a:stretch>
+        </p:blipFill>
+        <p:spPr bwMode="auto">
+          <a:xfrm>
+            <a:off x="2483768" y="2996952"/>
+            <a:ext cx="4038600" cy="1628776"/>
+          </a:xfrm>
+          <a:prstGeom prst="rect">
+            <a:avLst/>
+          </a:prstGeom>
+          <a:noFill/>
+        </p:spPr>
+      </p:pic>
+    </p:spTree>
+  </p:cSld>
+  <p:clrMapOvr>
+    <a:masterClrMapping/>
+  </p:clrMapOvr>
+  <p:timing>
+    <p:tnLst>
+      <p:par>
+        <p:cTn id="1" dur="indefinite" restart="never" nodeType="tmRoot"/>
+      </p:par>
+    </p:tnLst>
+  </p:timing>
+</p:sld>
+</file>
+
+<file path=ppt/slides/slide21.xml><?xml version="1.0" encoding="utf-8"?>
+<p:sld xmlns:a="http://schemas.openxmlformats.org/drawingml/2006/main" xmlns:r="http://schemas.openxmlformats.org/officeDocument/2006/relationships" xmlns:p="http://schemas.openxmlformats.org/presentationml/2006/main">
+  <p:cSld>
+    <p:spTree>
+      <p:nvGrpSpPr>
+        <p:cNvPr id="1" name=""/>
+        <p:cNvGrpSpPr/>
+        <p:nvPr/>
+      </p:nvGrpSpPr>
+      <p:grpSpPr>
+        <a:xfrm>
+          <a:off x="0" y="0"/>
+          <a:ext cx="0" cy="0"/>
+          <a:chOff x="0" y="0"/>
+          <a:chExt cx="0" cy="0"/>
+        </a:xfrm>
+      </p:grpSpPr>
+      <p:sp>
+        <p:nvSpPr>
+          <p:cNvPr id="2" name="Tytuł 1"/>
+          <p:cNvSpPr>
+            <a:spLocks noGrp="1"/>
+          </p:cNvSpPr>
+          <p:nvPr>
+            <p:ph type="title"/>
+          </p:nvPr>
+        </p:nvSpPr>
+        <p:spPr/>
+        <p:txBody>
+          <a:bodyPr/>
+          <a:lstStyle/>
+          <a:p>
+            <a:r>
+              <a:rPr lang="pl-PL" dirty="0" smtClean="0"/>
+              <a:t>Bibliografia</a:t>
+            </a:r>
+            <a:endParaRPr lang="pl-PL" dirty="0"/>
+          </a:p>
+        </p:txBody>
+      </p:sp>
+      <p:sp>
+        <p:nvSpPr>
+          <p:cNvPr id="3" name="Symbol zastępczy zawartości 2"/>
+          <p:cNvSpPr>
+            <a:spLocks noGrp="1"/>
+          </p:cNvSpPr>
+          <p:nvPr>
+            <p:ph idx="1"/>
+          </p:nvPr>
+        </p:nvSpPr>
+        <p:spPr/>
+        <p:txBody>
+          <a:bodyPr/>
+          <a:lstStyle/>
+          <a:p>
+            <a:r>
+              <a:rPr lang="pl-PL" dirty="0" smtClean="0"/>
+              <a:t>http://www.rabbitmq.com</a:t>
+            </a:r>
+            <a:endParaRPr lang="pl-PL" dirty="0"/>
+          </a:p>
+        </p:txBody>
+      </p:sp>
+    </p:spTree>
+  </p:cSld>
+  <p:clrMapOvr>
+    <a:masterClrMapping/>
+  </p:clrMapOvr>
+</p:sld>
+</file>
+
+<file path=ppt/slides/slide22.xml><?xml version="1.0" encoding="utf-8"?>
+<p:sld xmlns:a="http://schemas.openxmlformats.org/drawingml/2006/main" xmlns:r="http://schemas.openxmlformats.org/officeDocument/2006/relationships" xmlns:p="http://schemas.openxmlformats.org/presentationml/2006/main">
+  <p:cSld>
+    <p:spTree>
+      <p:nvGrpSpPr>
+        <p:cNvPr id="1" name=""/>
+        <p:cNvGrpSpPr/>
+        <p:nvPr/>
+      </p:nvGrpSpPr>
+      <p:grpSpPr>
+        <a:xfrm>
+          <a:off x="0" y="0"/>
+          <a:ext cx="0" cy="0"/>
+          <a:chOff x="0" y="0"/>
+          <a:chExt cx="0" cy="0"/>
+        </a:xfrm>
+      </p:grpSpPr>
+      <p:sp>
+        <p:nvSpPr>
+          <p:cNvPr id="2" name="Tytuł 1"/>
+          <p:cNvSpPr>
+            <a:spLocks noGrp="1"/>
+          </p:cNvSpPr>
+          <p:nvPr>
+            <p:ph type="title"/>
+          </p:nvPr>
+        </p:nvSpPr>
+        <p:spPr/>
+        <p:txBody>
+          <a:bodyPr/>
+          <a:lstStyle/>
+          <a:p>
+            <a:r>
+              <a:rPr lang="pl-PL" dirty="0" smtClean="0"/>
+              <a:t>Dziękujemy za uwagę!</a:t>
+            </a:r>
+            <a:endParaRPr lang="pl-PL" dirty="0"/>
+          </a:p>
+        </p:txBody>
+      </p:sp>
+      <p:sp>
+        <p:nvSpPr>
+          <p:cNvPr id="3" name="Symbol zastępczy zawartości 2"/>
+          <p:cNvSpPr>
+            <a:spLocks noGrp="1"/>
+          </p:cNvSpPr>
+          <p:nvPr>
+            <p:ph idx="1"/>
+          </p:nvPr>
+        </p:nvSpPr>
+        <p:spPr/>
+        <p:txBody>
+          <a:bodyPr/>
+          <a:lstStyle/>
+          <a:p>
+            <a:endParaRPr lang="pl-PL" dirty="0"/>
+          </a:p>
+        </p:txBody>
+      </p:sp>
+    </p:spTree>
   </p:cSld>
   <p:clrMapOvr>
     <a:masterClrMapping/>
@@ -5114,12 +7696,9 @@
           <a:p>
             <a:r>
               <a:rPr lang="pl-PL" dirty="0" smtClean="0"/>
-              <a:t>Umożliwia </a:t>
-            </a:r>
-            <a:r>
-              <a:rPr lang="pl-PL" dirty="0" smtClean="0"/>
-              <a:t>aplikacjom łączenie się między sobą</a:t>
-            </a:r>
+              <a:t>Komunikacja pomiędzy aplikacjami</a:t>
+            </a:r>
+            <a:endParaRPr lang="pl-PL" dirty="0" smtClean="0"/>
           </a:p>
           <a:p>
             <a:r>
@@ -5160,13 +7739,20 @@
     </p:spTree>
     <p:extLst>
       <p:ext uri="{BB962C8B-B14F-4D97-AF65-F5344CB8AC3E}">
-        <p14:creationId xmlns:p14="http://schemas.microsoft.com/office/powerpoint/2010/main" val="3851220960"/>
+        <p14:creationId xmlns:p14="http://schemas.microsoft.com/office/powerpoint/2010/main" xmlns="" val="3851220960"/>
       </p:ext>
     </p:extLst>
   </p:cSld>
   <p:clrMapOvr>
     <a:masterClrMapping/>
   </p:clrMapOvr>
+  <p:timing>
+    <p:tnLst>
+      <p:par>
+        <p:cTn id="1" dur="indefinite" restart="never" nodeType="tmRoot"/>
+      </p:par>
+    </p:tnLst>
+  </p:timing>
 </p:sld>
 </file>
 
@@ -5240,11 +7826,7 @@
             </a:pPr>
             <a:r>
               <a:rPr lang="pl-PL" sz="2800" dirty="0" smtClean="0"/>
-              <a:t>2007r</a:t>
-            </a:r>
-            <a:r>
-              <a:rPr lang="pl-PL" sz="2800" dirty="0" smtClean="0"/>
-              <a:t>. – powstał dzięki </a:t>
+              <a:t>2007r. – powstał dzięki </a:t>
             </a:r>
             <a:r>
               <a:rPr lang="pl-PL" sz="2800" dirty="0" err="1" smtClean="0"/>
@@ -5314,13 +7896,20 @@
     </p:spTree>
     <p:extLst>
       <p:ext uri="{BB962C8B-B14F-4D97-AF65-F5344CB8AC3E}">
-        <p14:creationId xmlns:p14="http://schemas.microsoft.com/office/powerpoint/2010/main" val="2568218372"/>
+        <p14:creationId xmlns:p14="http://schemas.microsoft.com/office/powerpoint/2010/main" xmlns="" val="2568218372"/>
       </p:ext>
     </p:extLst>
   </p:cSld>
   <p:clrMapOvr>
     <a:masterClrMapping/>
   </p:clrMapOvr>
+  <p:timing>
+    <p:tnLst>
+      <p:par>
+        <p:cTn id="1" dur="indefinite" restart="never" nodeType="tmRoot"/>
+      </p:par>
+    </p:tnLst>
+  </p:timing>
 </p:sld>
 </file>
 
@@ -5395,21 +7984,13 @@
           <a:p>
             <a:r>
               <a:rPr lang="pl-PL" dirty="0" smtClean="0"/>
-              <a:t>Łatwy w </a:t>
-            </a:r>
-            <a:r>
-              <a:rPr lang="pl-PL" dirty="0" smtClean="0"/>
-              <a:t>użyciu </a:t>
-            </a:r>
-          </a:p>
-          <a:p>
-            <a:r>
-              <a:rPr lang="pl-PL" dirty="0" smtClean="0"/>
-              <a:t>Dostępny </a:t>
-            </a:r>
-            <a:r>
-              <a:rPr lang="pl-PL" dirty="0" smtClean="0"/>
-              <a:t>na większości systemów operacyjnych</a:t>
+              <a:t>Łatwy w użyciu </a:t>
+            </a:r>
+          </a:p>
+          <a:p>
+            <a:r>
+              <a:rPr lang="pl-PL" dirty="0" smtClean="0"/>
+              <a:t>Dostępny na większości systemów operacyjnych</a:t>
             </a:r>
             <a:endParaRPr lang="pl-PL" dirty="0"/>
           </a:p>
@@ -5441,13 +8022,20 @@
     </p:spTree>
     <p:extLst>
       <p:ext uri="{BB962C8B-B14F-4D97-AF65-F5344CB8AC3E}">
-        <p14:creationId xmlns:p14="http://schemas.microsoft.com/office/powerpoint/2010/main" val="2990490345"/>
+        <p14:creationId xmlns:p14="http://schemas.microsoft.com/office/powerpoint/2010/main" xmlns="" val="2990490345"/>
       </p:ext>
     </p:extLst>
   </p:cSld>
   <p:clrMapOvr>
     <a:masterClrMapping/>
   </p:clrMapOvr>
+  <p:timing>
+    <p:tnLst>
+      <p:par>
+        <p:cTn id="1" dur="indefinite" restart="never" nodeType="tmRoot"/>
+      </p:par>
+    </p:tnLst>
+  </p:timing>
 </p:sld>
 </file>
 
@@ -5627,13 +8215,20 @@
     </p:spTree>
     <p:extLst>
       <p:ext uri="{BB962C8B-B14F-4D97-AF65-F5344CB8AC3E}">
-        <p14:creationId xmlns:p14="http://schemas.microsoft.com/office/powerpoint/2010/main" val="4087726809"/>
+        <p14:creationId xmlns:p14="http://schemas.microsoft.com/office/powerpoint/2010/main" xmlns="" val="4087726809"/>
       </p:ext>
     </p:extLst>
   </p:cSld>
   <p:clrMapOvr>
     <a:masterClrMapping/>
   </p:clrMapOvr>
+  <p:timing>
+    <p:tnLst>
+      <p:par>
+        <p:cTn id="1" dur="indefinite" restart="never" nodeType="tmRoot"/>
+      </p:par>
+    </p:tnLst>
+  </p:timing>
 </p:sld>
 </file>
 
@@ -5693,15 +8288,17 @@
           <a:lstStyle/>
           <a:p>
             <a:r>
-              <a:rPr lang="pl-PL" dirty="0"/>
-              <a:t>Porozumiewanie się jest asynchroniczne, oddzielenie następuje przez separację wysyłania oraz odbierania danych</a:t>
-            </a:r>
-          </a:p>
-          <a:p>
-            <a:r>
-              <a:rPr lang="pl-PL" dirty="0" smtClean="0"/>
-              <a:t>Pracuje na większości systemów operacyjnych</a:t>
-            </a:r>
+              <a:rPr lang="pl-PL" dirty="0" smtClean="0"/>
+              <a:t>Asynchroniczne porozumiewanie</a:t>
+            </a:r>
+            <a:endParaRPr lang="pl-PL" dirty="0"/>
+          </a:p>
+          <a:p>
+            <a:r>
+              <a:rPr lang="pl-PL" dirty="0" smtClean="0"/>
+              <a:t>Kompatybilność</a:t>
+            </a:r>
+            <a:endParaRPr lang="pl-PL" dirty="0" smtClean="0"/>
           </a:p>
           <a:p>
             <a:r>
@@ -5715,36 +8312,92 @@
           </a:p>
           <a:p>
             <a:r>
-              <a:rPr lang="pl-PL" dirty="0" smtClean="0"/>
-              <a:t>Dużo materiałów i ciągle rozwijająca się społeczność dzięki komercyjnemu wsparciu</a:t>
-            </a:r>
-          </a:p>
-          <a:p>
-            <a:r>
-              <a:rPr lang="pl-PL" dirty="0" smtClean="0"/>
-              <a:t>Niezawodny, zapewnia bezpieczeństwo wiadomości, potwierdzenie dostarczenia</a:t>
+              <a:rPr lang="pl-PL" dirty="0" err="1" smtClean="0"/>
+              <a:t>Rabbitmq.com</a:t>
+            </a:r>
+            <a:endParaRPr lang="pl-PL" dirty="0" smtClean="0"/>
+          </a:p>
+          <a:p>
+            <a:r>
+              <a:rPr lang="pl-PL" dirty="0" smtClean="0"/>
+              <a:t>Niezawodny:</a:t>
+            </a:r>
+          </a:p>
+          <a:p>
+            <a:pPr lvl="1"/>
+            <a:r>
+              <a:rPr lang="pl-PL" dirty="0" err="1" smtClean="0"/>
+              <a:t>M</a:t>
+            </a:r>
+            <a:r>
+              <a:rPr lang="pl-PL" dirty="0" err="1" smtClean="0"/>
+              <a:t>essage</a:t>
+            </a:r>
+            <a:r>
+              <a:rPr lang="pl-PL" dirty="0" smtClean="0"/>
+              <a:t> </a:t>
+            </a:r>
+            <a:r>
+              <a:rPr lang="pl-PL" dirty="0" err="1" smtClean="0"/>
+              <a:t>acknowledgment</a:t>
             </a:r>
             <a:endParaRPr lang="pl-PL" dirty="0"/>
           </a:p>
           <a:p>
+            <a:pPr lvl="1"/>
+            <a:r>
+              <a:rPr lang="pl-PL" dirty="0" err="1" smtClean="0"/>
+              <a:t>Queue</a:t>
+            </a:r>
+            <a:r>
+              <a:rPr lang="pl-PL" dirty="0" smtClean="0"/>
+              <a:t>, </a:t>
+            </a:r>
+            <a:r>
+              <a:rPr lang="pl-PL" dirty="0" err="1" smtClean="0"/>
+              <a:t>message</a:t>
+            </a:r>
+            <a:r>
+              <a:rPr lang="pl-PL" dirty="0" smtClean="0"/>
+              <a:t> </a:t>
+            </a:r>
+            <a:r>
+              <a:rPr lang="pl-PL" dirty="0" err="1" smtClean="0"/>
+              <a:t>durability</a:t>
+            </a:r>
+            <a:endParaRPr lang="pl-PL" dirty="0" smtClean="0"/>
+          </a:p>
+          <a:p>
+            <a:pPr lvl="1"/>
             <a:r>
               <a:rPr lang="pl-PL" dirty="0" err="1" smtClean="0"/>
               <a:t>Klastrowanie</a:t>
             </a:r>
-            <a:endParaRPr lang="pl-PL" dirty="0"/>
+            <a:r>
+              <a:rPr lang="pl-PL" dirty="0" smtClean="0"/>
+              <a:t> </a:t>
+            </a:r>
+            <a:endParaRPr lang="pl-PL" dirty="0" smtClean="0"/>
           </a:p>
         </p:txBody>
       </p:sp>
     </p:spTree>
     <p:extLst>
       <p:ext uri="{BB962C8B-B14F-4D97-AF65-F5344CB8AC3E}">
-        <p14:creationId xmlns:p14="http://schemas.microsoft.com/office/powerpoint/2010/main" val="549056339"/>
+        <p14:creationId xmlns:p14="http://schemas.microsoft.com/office/powerpoint/2010/main" xmlns="" val="549056339"/>
       </p:ext>
     </p:extLst>
   </p:cSld>
   <p:clrMapOvr>
     <a:masterClrMapping/>
   </p:clrMapOvr>
+  <p:timing>
+    <p:tnLst>
+      <p:par>
+        <p:cTn id="1" dur="indefinite" restart="never" nodeType="tmRoot"/>
+      </p:par>
+    </p:tnLst>
+  </p:timing>
 </p:sld>
 </file>
 
@@ -5805,36 +8458,55 @@
           <a:p>
             <a:r>
               <a:rPr lang="pl-PL" dirty="0" smtClean="0"/>
-              <a:t>Jedyne co musimy zrobić, to pobrać serwer </a:t>
+              <a:t>Maszyna wirtualna </a:t>
             </a:r>
             <a:r>
               <a:rPr lang="pl-PL" dirty="0" err="1" smtClean="0"/>
-              <a:t>RabbitMQ</a:t>
-            </a:r>
-            <a:r>
-              <a:rPr lang="pl-PL" dirty="0" smtClean="0"/>
-              <a:t> dostępny na stronie aplikacji, którego instalacja jest banalnie prosta na większości systemów operacyjnych.</a:t>
-            </a:r>
-          </a:p>
-          <a:p>
-            <a:r>
-              <a:rPr lang="pl-PL" dirty="0" smtClean="0"/>
-              <a:t>Wykorzystanie w implementacji odpowiedniej biblioteki klienckiej AMQP, m.in.:</a:t>
+              <a:t>erlanga</a:t>
+            </a:r>
+            <a:r>
+              <a:rPr lang="pl-PL" dirty="0" smtClean="0"/>
+              <a:t> </a:t>
+            </a:r>
+          </a:p>
+          <a:p>
+            <a:r>
+              <a:rPr lang="pl-PL" dirty="0" smtClean="0"/>
+              <a:t>Sam serwer – </a:t>
+            </a:r>
+            <a:r>
+              <a:rPr lang="pl-PL" dirty="0" err="1" smtClean="0"/>
+              <a:t>rabbitMQ</a:t>
+            </a:r>
+            <a:endParaRPr lang="pl-PL" dirty="0" smtClean="0"/>
+          </a:p>
+          <a:p>
+            <a:r>
+              <a:rPr lang="pl-PL" dirty="0" err="1" smtClean="0"/>
+              <a:t>Client</a:t>
+            </a:r>
+            <a:r>
+              <a:rPr lang="pl-PL" dirty="0" smtClean="0"/>
+              <a:t> AMQP dla języków, które są wykorzystane w aplikacji, np</a:t>
+            </a:r>
+            <a:r>
+              <a:rPr lang="pl-PL" dirty="0" smtClean="0"/>
+              <a:t>. :</a:t>
             </a:r>
           </a:p>
           <a:p>
             <a:pPr lvl="1"/>
             <a:r>
-              <a:rPr lang="pl-PL" dirty="0" err="1"/>
-              <a:t>j</a:t>
-            </a:r>
-            <a:r>
               <a:rPr lang="pl-PL" dirty="0" err="1" smtClean="0"/>
-              <a:t>ava</a:t>
-            </a:r>
-            <a:r>
-              <a:rPr lang="pl-PL" dirty="0" smtClean="0"/>
-              <a:t> -&gt; </a:t>
+              <a:t>java</a:t>
+            </a:r>
+            <a:r>
+              <a:rPr lang="pl-PL" dirty="0" smtClean="0"/>
+              <a:t> </a:t>
+            </a:r>
+            <a:r>
+              <a:rPr lang="pl-PL" dirty="0" smtClean="0"/>
+              <a:t>-&gt; </a:t>
             </a:r>
             <a:r>
               <a:rPr lang="pl-PL" dirty="0" err="1" smtClean="0"/>
@@ -5886,13 +8558,292 @@
     </p:spTree>
     <p:extLst>
       <p:ext uri="{BB962C8B-B14F-4D97-AF65-F5344CB8AC3E}">
-        <p14:creationId xmlns:p14="http://schemas.microsoft.com/office/powerpoint/2010/main" val="790451786"/>
+        <p14:creationId xmlns:p14="http://schemas.microsoft.com/office/powerpoint/2010/main" xmlns="" val="790451786"/>
       </p:ext>
     </p:extLst>
   </p:cSld>
   <p:clrMapOvr>
     <a:masterClrMapping/>
   </p:clrMapOvr>
+  <p:timing>
+    <p:tnLst>
+      <p:par>
+        <p:cTn id="1" dur="indefinite" restart="never" nodeType="tmRoot"/>
+      </p:par>
+    </p:tnLst>
+  </p:timing>
+</p:sld>
+</file>
+
+<file path=ppt/slides/slide9.xml><?xml version="1.0" encoding="utf-8"?>
+<p:sld xmlns:a="http://schemas.openxmlformats.org/drawingml/2006/main" xmlns:r="http://schemas.openxmlformats.org/officeDocument/2006/relationships" xmlns:p="http://schemas.openxmlformats.org/presentationml/2006/main">
+  <p:cSld>
+    <p:spTree>
+      <p:nvGrpSpPr>
+        <p:cNvPr id="1" name=""/>
+        <p:cNvGrpSpPr/>
+        <p:nvPr/>
+      </p:nvGrpSpPr>
+      <p:grpSpPr>
+        <a:xfrm>
+          <a:off x="0" y="0"/>
+          <a:ext cx="0" cy="0"/>
+          <a:chOff x="0" y="0"/>
+          <a:chExt cx="0" cy="0"/>
+        </a:xfrm>
+      </p:grpSpPr>
+      <p:sp>
+        <p:nvSpPr>
+          <p:cNvPr id="2" name="Tytuł 1"/>
+          <p:cNvSpPr>
+            <a:spLocks noGrp="1"/>
+          </p:cNvSpPr>
+          <p:nvPr>
+            <p:ph type="title"/>
+          </p:nvPr>
+        </p:nvSpPr>
+        <p:spPr/>
+        <p:txBody>
+          <a:bodyPr/>
+          <a:lstStyle/>
+          <a:p>
+            <a:r>
+              <a:rPr lang="pl-PL" dirty="0" smtClean="0"/>
+              <a:t>Ogólny schemat użytkowania</a:t>
+            </a:r>
+            <a:endParaRPr lang="pl-PL" dirty="0"/>
+          </a:p>
+        </p:txBody>
+      </p:sp>
+      <p:sp>
+        <p:nvSpPr>
+          <p:cNvPr id="3" name="Symbol zastępczy zawartości 2"/>
+          <p:cNvSpPr>
+            <a:spLocks noGrp="1"/>
+          </p:cNvSpPr>
+          <p:nvPr>
+            <p:ph idx="1"/>
+          </p:nvPr>
+        </p:nvSpPr>
+        <p:spPr>
+          <a:xfrm>
+            <a:off x="457200" y="1927373"/>
+            <a:ext cx="8229600" cy="4525963"/>
+          </a:xfrm>
+        </p:spPr>
+        <p:txBody>
+          <a:bodyPr/>
+          <a:lstStyle/>
+          <a:p>
+            <a:pPr algn="ctr">
+              <a:buNone/>
+            </a:pPr>
+            <a:r>
+              <a:rPr lang="pl-PL" dirty="0" smtClean="0"/>
+              <a:t>Połączenie aplikacji z Rabbitem (</a:t>
+            </a:r>
+            <a:r>
+              <a:rPr lang="pl-PL" dirty="0" err="1" smtClean="0"/>
+              <a:t>connection</a:t>
+            </a:r>
+            <a:r>
+              <a:rPr lang="pl-PL" dirty="0" smtClean="0"/>
+              <a:t>)</a:t>
+            </a:r>
+          </a:p>
+          <a:p>
+            <a:pPr algn="ctr">
+              <a:buNone/>
+            </a:pPr>
+            <a:endParaRPr lang="pl-PL" dirty="0" smtClean="0"/>
+          </a:p>
+          <a:p>
+            <a:pPr algn="ctr">
+              <a:buNone/>
+            </a:pPr>
+            <a:r>
+              <a:rPr lang="pl-PL" dirty="0" smtClean="0"/>
+              <a:t>Utworzenie kanału w obrębie tego połączenia (channel)</a:t>
+            </a:r>
+          </a:p>
+          <a:p>
+            <a:pPr algn="ctr">
+              <a:buNone/>
+            </a:pPr>
+            <a:endParaRPr lang="pl-PL" dirty="0" smtClean="0"/>
+          </a:p>
+          <a:p>
+            <a:pPr algn="ctr">
+              <a:buNone/>
+            </a:pPr>
+            <a:r>
+              <a:rPr lang="pl-PL" dirty="0" smtClean="0"/>
+              <a:t>Wysyłanie wiadomości, odbieranie, ustalanie </a:t>
+            </a:r>
+            <a:r>
+              <a:rPr lang="pl-PL" dirty="0" err="1" smtClean="0"/>
+              <a:t>routingu</a:t>
+            </a:r>
+            <a:endParaRPr lang="pl-PL" dirty="0" smtClean="0"/>
+          </a:p>
+          <a:p>
+            <a:pPr algn="ctr">
+              <a:buNone/>
+            </a:pPr>
+            <a:endParaRPr lang="pl-PL" dirty="0" smtClean="0"/>
+          </a:p>
+          <a:p>
+            <a:pPr algn="ctr">
+              <a:buNone/>
+            </a:pPr>
+            <a:r>
+              <a:rPr lang="pl-PL" dirty="0" smtClean="0"/>
+              <a:t>Zamknięcie połączenia</a:t>
+            </a:r>
+          </a:p>
+          <a:p>
+            <a:pPr algn="ctr">
+              <a:buNone/>
+            </a:pPr>
+            <a:endParaRPr lang="pl-PL" dirty="0" smtClean="0"/>
+          </a:p>
+          <a:p>
+            <a:pPr algn="ctr">
+              <a:buNone/>
+            </a:pPr>
+            <a:endParaRPr lang="pl-PL" dirty="0" smtClean="0"/>
+          </a:p>
+          <a:p>
+            <a:pPr algn="ctr">
+              <a:buNone/>
+            </a:pPr>
+            <a:endParaRPr lang="pl-PL" dirty="0" smtClean="0"/>
+          </a:p>
+          <a:p>
+            <a:pPr algn="ctr">
+              <a:buNone/>
+            </a:pPr>
+            <a:endParaRPr lang="pl-PL" dirty="0" smtClean="0"/>
+          </a:p>
+          <a:p>
+            <a:pPr algn="ctr">
+              <a:buNone/>
+            </a:pPr>
+            <a:endParaRPr lang="pl-PL" dirty="0"/>
+          </a:p>
+        </p:txBody>
+      </p:sp>
+      <p:cxnSp>
+        <p:nvCxnSpPr>
+          <p:cNvPr id="6" name="Łącznik prosty ze strzałką 5"/>
+          <p:cNvCxnSpPr/>
+          <p:nvPr/>
+        </p:nvCxnSpPr>
+        <p:spPr>
+          <a:xfrm>
+            <a:off x="4547617" y="2358405"/>
+            <a:ext cx="0" cy="432048"/>
+          </a:xfrm>
+          <a:prstGeom prst="straightConnector1">
+            <a:avLst/>
+          </a:prstGeom>
+          <a:ln>
+            <a:tailEnd type="arrow"/>
+          </a:ln>
+        </p:spPr>
+        <p:style>
+          <a:lnRef idx="1">
+            <a:schemeClr val="accent1"/>
+          </a:lnRef>
+          <a:fillRef idx="0">
+            <a:schemeClr val="accent1"/>
+          </a:fillRef>
+          <a:effectRef idx="0">
+            <a:schemeClr val="accent1"/>
+          </a:effectRef>
+          <a:fontRef idx="minor">
+            <a:schemeClr val="tx1"/>
+          </a:fontRef>
+        </p:style>
+      </p:cxnSp>
+      <p:cxnSp>
+        <p:nvCxnSpPr>
+          <p:cNvPr id="7" name="Łącznik prosty ze strzałką 6"/>
+          <p:cNvCxnSpPr/>
+          <p:nvPr/>
+        </p:nvCxnSpPr>
+        <p:spPr>
+          <a:xfrm>
+            <a:off x="4543425" y="3563491"/>
+            <a:ext cx="0" cy="432048"/>
+          </a:xfrm>
+          <a:prstGeom prst="straightConnector1">
+            <a:avLst/>
+          </a:prstGeom>
+          <a:ln>
+            <a:tailEnd type="arrow"/>
+          </a:ln>
+        </p:spPr>
+        <p:style>
+          <a:lnRef idx="1">
+            <a:schemeClr val="accent1"/>
+          </a:lnRef>
+          <a:fillRef idx="0">
+            <a:schemeClr val="accent1"/>
+          </a:fillRef>
+          <a:effectRef idx="0">
+            <a:schemeClr val="accent1"/>
+          </a:effectRef>
+          <a:fontRef idx="minor">
+            <a:schemeClr val="tx1"/>
+          </a:fontRef>
+        </p:style>
+      </p:cxnSp>
+      <p:cxnSp>
+        <p:nvCxnSpPr>
+          <p:cNvPr id="8" name="Łącznik prosty ze strzałką 7"/>
+          <p:cNvCxnSpPr/>
+          <p:nvPr/>
+        </p:nvCxnSpPr>
+        <p:spPr>
+          <a:xfrm>
+            <a:off x="4533900" y="4509120"/>
+            <a:ext cx="0" cy="432048"/>
+          </a:xfrm>
+          <a:prstGeom prst="straightConnector1">
+            <a:avLst/>
+          </a:prstGeom>
+          <a:ln>
+            <a:tailEnd type="arrow"/>
+          </a:ln>
+        </p:spPr>
+        <p:style>
+          <a:lnRef idx="1">
+            <a:schemeClr val="accent1"/>
+          </a:lnRef>
+          <a:fillRef idx="0">
+            <a:schemeClr val="accent1"/>
+          </a:fillRef>
+          <a:effectRef idx="0">
+            <a:schemeClr val="accent1"/>
+          </a:effectRef>
+          <a:fontRef idx="minor">
+            <a:schemeClr val="tx1"/>
+          </a:fontRef>
+        </p:style>
+      </p:cxnSp>
+    </p:spTree>
+  </p:cSld>
+  <p:clrMapOvr>
+    <a:masterClrMapping/>
+  </p:clrMapOvr>
+  <p:timing>
+    <p:tnLst>
+      <p:par>
+        <p:cTn id="1" dur="indefinite" restart="never" nodeType="tmRoot"/>
+      </p:par>
+    </p:tnLst>
+  </p:timing>
 </p:sld>
 </file>
 

</xml_diff>